<commit_message>
added rules to junit 4 ppt
</commit_message>
<xml_diff>
--- a/Presentations/Junit4/Junit4.pptx
+++ b/Presentations/Junit4/Junit4.pptx
@@ -24,21 +24,33 @@
     <p:sldId id="386" r:id="rId18"/>
     <p:sldId id="387" r:id="rId19"/>
     <p:sldId id="300" r:id="rId20"/>
-    <p:sldId id="390" r:id="rId21"/>
-    <p:sldId id="392" r:id="rId22"/>
-    <p:sldId id="391" r:id="rId23"/>
-    <p:sldId id="389" r:id="rId24"/>
-    <p:sldId id="394" r:id="rId25"/>
-    <p:sldId id="395" r:id="rId26"/>
-    <p:sldId id="393" r:id="rId27"/>
-    <p:sldId id="397" r:id="rId28"/>
-    <p:sldId id="399" r:id="rId29"/>
-    <p:sldId id="400" r:id="rId30"/>
-    <p:sldId id="398" r:id="rId31"/>
-    <p:sldId id="396" r:id="rId32"/>
-    <p:sldId id="402" r:id="rId33"/>
-    <p:sldId id="401" r:id="rId34"/>
-    <p:sldId id="259" r:id="rId35"/>
+    <p:sldId id="404" r:id="rId21"/>
+    <p:sldId id="406" r:id="rId22"/>
+    <p:sldId id="405" r:id="rId23"/>
+    <p:sldId id="407" r:id="rId24"/>
+    <p:sldId id="408" r:id="rId25"/>
+    <p:sldId id="409" r:id="rId26"/>
+    <p:sldId id="410" r:id="rId27"/>
+    <p:sldId id="411" r:id="rId28"/>
+    <p:sldId id="412" r:id="rId29"/>
+    <p:sldId id="413" r:id="rId30"/>
+    <p:sldId id="414" r:id="rId31"/>
+    <p:sldId id="403" r:id="rId32"/>
+    <p:sldId id="390" r:id="rId33"/>
+    <p:sldId id="392" r:id="rId34"/>
+    <p:sldId id="391" r:id="rId35"/>
+    <p:sldId id="389" r:id="rId36"/>
+    <p:sldId id="394" r:id="rId37"/>
+    <p:sldId id="395" r:id="rId38"/>
+    <p:sldId id="393" r:id="rId39"/>
+    <p:sldId id="397" r:id="rId40"/>
+    <p:sldId id="399" r:id="rId41"/>
+    <p:sldId id="400" r:id="rId42"/>
+    <p:sldId id="398" r:id="rId43"/>
+    <p:sldId id="396" r:id="rId44"/>
+    <p:sldId id="402" r:id="rId45"/>
+    <p:sldId id="401" r:id="rId46"/>
+    <p:sldId id="259" r:id="rId47"/>
   </p:sldIdLst>
   <p:sldSz cx="9144000" cy="6858000" type="screen4x3"/>
   <p:notesSz cx="6858000" cy="9144000"/>
@@ -5812,12 +5824,12 @@
           <a:p>
             <a:pPr lvl="1"/>
             <a:r>
-              <a:rPr lang="en-US" sz="3200">
+              <a:rPr lang="en-US" sz="3200" dirty="0">
                 <a:solidFill>
                   <a:schemeClr val="bg1"/>
                 </a:solidFill>
               </a:rPr>
-              <a:t>Hamcrest Matchers</a:t>
+              <a:t>Rule API</a:t>
             </a:r>
             <a:endParaRPr lang="fr-CA" sz="3000" dirty="0">
               <a:solidFill>
@@ -5848,61 +5860,42 @@
           <a:lstStyle/>
           <a:p>
             <a:r>
-              <a:rPr lang="en-US" sz="1400">
-                <a:solidFill>
-                  <a:srgbClr val="3C5790"/>
-                </a:solidFill>
-              </a:rPr>
-              <a:t>Hamcrest is a library that contains a lot of useful matchers objects: constraints, predicates.</a:t>
-            </a:r>
-          </a:p>
-          <a:p>
-            <a:r>
-              <a:rPr lang="en-US" sz="1400">
-                <a:solidFill>
-                  <a:srgbClr val="3C5790"/>
-                </a:solidFill>
-              </a:rPr>
-              <a:t>Hamcrest isn't a testing framework, it helps specifying simple matching rules.</a:t>
-            </a:r>
-            <a:endParaRPr lang="en-US" sz="1400" dirty="0">
-              <a:solidFill>
-                <a:srgbClr val="3C5790"/>
-              </a:solidFill>
-            </a:endParaRPr>
-          </a:p>
-        </p:txBody>
-      </p:sp>
-      <p:pic>
-        <p:nvPicPr>
-          <p:cNvPr id="2" name="Picture 1">
-            <a:extLst>
-              <a:ext uri="{FF2B5EF4-FFF2-40B4-BE49-F238E27FC236}">
-                <a16:creationId xmlns:a16="http://schemas.microsoft.com/office/drawing/2014/main" id="{F479C3A1-2CE3-4F74-BC27-1D8D756CF21C}"/>
-              </a:ext>
-            </a:extLst>
-          </p:cNvPr>
-          <p:cNvPicPr>
-            <a:picLocks noChangeAspect="1"/>
-          </p:cNvPicPr>
-          <p:nvPr/>
-        </p:nvPicPr>
-        <p:blipFill>
-          <a:blip r:embed="rId3"/>
-          <a:stretch>
-            <a:fillRect/>
-          </a:stretch>
-        </p:blipFill>
-        <p:spPr>
-          <a:xfrm>
-            <a:off x="990600" y="3505200"/>
-            <a:ext cx="7396162" cy="2399424"/>
-          </a:xfrm>
-          <a:prstGeom prst="rect">
-            <a:avLst/>
-          </a:prstGeom>
-        </p:spPr>
-      </p:pic>
+              <a:rPr lang="en-US" sz="1400" dirty="0">
+                <a:solidFill>
+                  <a:srgbClr val="3C5790"/>
+                </a:solidFill>
+              </a:rPr>
+              <a:t>JUnit provides several useful, predefined rules as part of the library</a:t>
+            </a:r>
+          </a:p>
+          <a:p>
+            <a:r>
+              <a:rPr lang="en-US" sz="1400" dirty="0">
+                <a:solidFill>
+                  <a:srgbClr val="3C5790"/>
+                </a:solidFill>
+              </a:rPr>
+              <a:t>These rules can be found under </a:t>
+            </a:r>
+            <a:r>
+              <a:rPr lang="en-US" sz="1400" b="1" dirty="0" err="1">
+                <a:solidFill>
+                  <a:srgbClr val="3C5790"/>
+                </a:solidFill>
+              </a:rPr>
+              <a:t>org.junit.rules</a:t>
+            </a:r>
+            <a:r>
+              <a:rPr lang="en-US" sz="1400" dirty="0">
+                <a:solidFill>
+                  <a:srgbClr val="3C5790"/>
+                </a:solidFill>
+              </a:rPr>
+              <a:t> package</a:t>
+            </a:r>
+          </a:p>
+        </p:txBody>
+      </p:sp>
     </p:spTree>
   </p:cSld>
   <p:clrMapOvr>
@@ -6093,6 +6086,16 @@
           </a:p>
           <a:p>
             <a:r>
+              <a:rPr lang="fr-CA" sz="1600" dirty="0">
+                <a:solidFill>
+                  <a:srgbClr val="3C5790"/>
+                </a:solidFill>
+              </a:rPr>
+              <a:t>Rule API</a:t>
+            </a:r>
+          </a:p>
+          <a:p>
+            <a:r>
               <a:rPr lang="fr-CA" sz="1600" dirty="0" err="1">
                 <a:solidFill>
                   <a:srgbClr val="3C5790"/>
@@ -6229,6 +6232,2285 @@
 </file>
 
 <file path=ppt/slides/slide20.xml><?xml version="1.0" encoding="utf-8"?>
+<p:sld xmlns:a="http://schemas.openxmlformats.org/drawingml/2006/main" xmlns:r="http://schemas.openxmlformats.org/officeDocument/2006/relationships" xmlns:p="http://schemas.openxmlformats.org/presentationml/2006/main">
+  <p:cSld>
+    <p:bg>
+      <p:bgPr>
+        <a:blipFill dpi="0" rotWithShape="0">
+          <a:blip r:embed="rId2" cstate="print"/>
+          <a:srcRect/>
+          <a:stretch>
+            <a:fillRect/>
+          </a:stretch>
+        </a:blipFill>
+        <a:effectLst/>
+      </p:bgPr>
+    </p:bg>
+    <p:spTree>
+      <p:nvGrpSpPr>
+        <p:cNvPr id="1" name=""/>
+        <p:cNvGrpSpPr/>
+        <p:nvPr/>
+      </p:nvGrpSpPr>
+      <p:grpSpPr>
+        <a:xfrm>
+          <a:off x="0" y="0"/>
+          <a:ext cx="0" cy="0"/>
+          <a:chOff x="0" y="0"/>
+          <a:chExt cx="0" cy="0"/>
+        </a:xfrm>
+      </p:grpSpPr>
+      <p:sp>
+        <p:nvSpPr>
+          <p:cNvPr id="4098" name="Titre 3"/>
+          <p:cNvSpPr>
+            <a:spLocks noGrp="1"/>
+          </p:cNvSpPr>
+          <p:nvPr>
+            <p:ph type="title"/>
+          </p:nvPr>
+        </p:nvSpPr>
+        <p:spPr>
+          <a:xfrm>
+            <a:off x="228600" y="274638"/>
+            <a:ext cx="8686800" cy="1143000"/>
+          </a:xfrm>
+        </p:spPr>
+        <p:txBody>
+          <a:bodyPr/>
+          <a:lstStyle/>
+          <a:p>
+            <a:pPr lvl="1"/>
+            <a:r>
+              <a:rPr lang="en-US" sz="3200" dirty="0">
+                <a:solidFill>
+                  <a:schemeClr val="bg1"/>
+                </a:solidFill>
+              </a:rPr>
+              <a:t>Rule API (cont.)</a:t>
+            </a:r>
+            <a:endParaRPr lang="fr-CA" sz="3000" dirty="0">
+              <a:solidFill>
+                <a:schemeClr val="bg1"/>
+              </a:solidFill>
+            </a:endParaRPr>
+          </a:p>
+        </p:txBody>
+      </p:sp>
+      <p:sp>
+        <p:nvSpPr>
+          <p:cNvPr id="4099" name="Espace réservé du contenu 4"/>
+          <p:cNvSpPr>
+            <a:spLocks noGrp="1"/>
+          </p:cNvSpPr>
+          <p:nvPr>
+            <p:ph idx="1"/>
+          </p:nvPr>
+        </p:nvSpPr>
+        <p:spPr>
+          <a:xfrm>
+            <a:off x="76200" y="1981200"/>
+            <a:ext cx="8915400" cy="1295400"/>
+          </a:xfrm>
+        </p:spPr>
+        <p:txBody>
+          <a:bodyPr/>
+          <a:lstStyle/>
+          <a:p>
+            <a:r>
+              <a:rPr lang="en-US" sz="1400" b="1" dirty="0">
+                <a:solidFill>
+                  <a:srgbClr val="3C5790"/>
+                </a:solidFill>
+              </a:rPr>
+              <a:t>The</a:t>
+            </a:r>
+            <a:r>
+              <a:rPr lang="en-US" sz="1400" dirty="0">
+                <a:solidFill>
+                  <a:srgbClr val="3C5790"/>
+                </a:solidFill>
+              </a:rPr>
+              <a:t> </a:t>
+            </a:r>
+            <a:r>
+              <a:rPr lang="en-US" sz="1400" b="1" dirty="0" err="1">
+                <a:solidFill>
+                  <a:srgbClr val="3C5790"/>
+                </a:solidFill>
+              </a:rPr>
+              <a:t>TemporaryFolder</a:t>
+            </a:r>
+            <a:r>
+              <a:rPr lang="en-US" sz="1400" dirty="0">
+                <a:solidFill>
+                  <a:srgbClr val="3C5790"/>
+                </a:solidFill>
+              </a:rPr>
+              <a:t> </a:t>
+            </a:r>
+            <a:r>
+              <a:rPr lang="en-US" sz="1400" b="1" dirty="0">
+                <a:solidFill>
+                  <a:srgbClr val="3C5790"/>
+                </a:solidFill>
+              </a:rPr>
+              <a:t>rule</a:t>
+            </a:r>
+          </a:p>
+          <a:p>
+            <a:r>
+              <a:rPr lang="en-US" sz="1400" dirty="0">
+                <a:solidFill>
+                  <a:srgbClr val="3C5790"/>
+                </a:solidFill>
+              </a:rPr>
+              <a:t>Sometimes we need access to a temporary file or folder.</a:t>
+            </a:r>
+          </a:p>
+          <a:p>
+            <a:r>
+              <a:rPr lang="en-US" sz="1400" dirty="0">
+                <a:solidFill>
+                  <a:srgbClr val="3C5790"/>
+                </a:solidFill>
+              </a:rPr>
+              <a:t>However, managing the creation and deletion of these files can be cumbersome.</a:t>
+            </a:r>
+          </a:p>
+          <a:p>
+            <a:r>
+              <a:rPr lang="en-US" sz="1400" dirty="0">
+                <a:solidFill>
+                  <a:srgbClr val="3C5790"/>
+                </a:solidFill>
+              </a:rPr>
+              <a:t>We can use the </a:t>
+            </a:r>
+            <a:r>
+              <a:rPr lang="en-US" sz="1400" dirty="0" err="1">
+                <a:solidFill>
+                  <a:srgbClr val="3C5790"/>
+                </a:solidFill>
+              </a:rPr>
+              <a:t>TemporaryFolder</a:t>
+            </a:r>
+            <a:r>
+              <a:rPr lang="en-US" sz="1400" dirty="0">
+                <a:solidFill>
+                  <a:srgbClr val="3C5790"/>
+                </a:solidFill>
+              </a:rPr>
+              <a:t> rule so we can manage the creation/deletion of files/folders.</a:t>
+            </a:r>
+          </a:p>
+          <a:p>
+            <a:r>
+              <a:rPr lang="en-US" sz="1400" dirty="0">
+                <a:solidFill>
+                  <a:srgbClr val="3C5790"/>
+                </a:solidFill>
+              </a:rPr>
+              <a:t>From JUnit 4.13 we can create the </a:t>
+            </a:r>
+            <a:r>
+              <a:rPr lang="en-US" sz="1400" dirty="0" err="1">
+                <a:solidFill>
+                  <a:srgbClr val="3C5790"/>
+                </a:solidFill>
+              </a:rPr>
+              <a:t>TemporaryFolder</a:t>
+            </a:r>
+            <a:r>
+              <a:rPr lang="en-US" sz="1400" dirty="0">
+                <a:solidFill>
+                  <a:srgbClr val="3C5790"/>
+                </a:solidFill>
+              </a:rPr>
+              <a:t> objects as </a:t>
+            </a:r>
+            <a:r>
+              <a:rPr lang="en-US" sz="1400" dirty="0" err="1">
+                <a:solidFill>
+                  <a:srgbClr val="3C5790"/>
+                </a:solidFill>
+              </a:rPr>
+              <a:t>TemporaryFolder.builder</a:t>
+            </a:r>
+            <a:r>
+              <a:rPr lang="en-US" sz="1400" dirty="0">
+                <a:solidFill>
+                  <a:srgbClr val="3C5790"/>
+                </a:solidFill>
+              </a:rPr>
+              <a:t>().</a:t>
+            </a:r>
+            <a:r>
+              <a:rPr lang="en-US" sz="1400" dirty="0" err="1">
+                <a:solidFill>
+                  <a:srgbClr val="3C5790"/>
+                </a:solidFill>
+              </a:rPr>
+              <a:t>assureDeletion</a:t>
+            </a:r>
+            <a:r>
+              <a:rPr lang="en-US" sz="1400" dirty="0">
+                <a:solidFill>
+                  <a:srgbClr val="3C5790"/>
+                </a:solidFill>
+              </a:rPr>
+              <a:t>().build();</a:t>
+            </a:r>
+          </a:p>
+        </p:txBody>
+      </p:sp>
+      <p:pic>
+        <p:nvPicPr>
+          <p:cNvPr id="2" name="Picture 1">
+            <a:extLst>
+              <a:ext uri="{FF2B5EF4-FFF2-40B4-BE49-F238E27FC236}">
+                <a16:creationId xmlns:a16="http://schemas.microsoft.com/office/drawing/2014/main" id="{850C9CAE-E980-413C-8711-79F2417E55FF}"/>
+              </a:ext>
+            </a:extLst>
+          </p:cNvPr>
+          <p:cNvPicPr>
+            <a:picLocks noChangeAspect="1"/>
+          </p:cNvPicPr>
+          <p:nvPr/>
+        </p:nvPicPr>
+        <p:blipFill>
+          <a:blip r:embed="rId3"/>
+          <a:stretch>
+            <a:fillRect/>
+          </a:stretch>
+        </p:blipFill>
+        <p:spPr>
+          <a:xfrm>
+            <a:off x="609600" y="3466226"/>
+            <a:ext cx="7615238" cy="2096374"/>
+          </a:xfrm>
+          <a:prstGeom prst="rect">
+            <a:avLst/>
+          </a:prstGeom>
+        </p:spPr>
+      </p:pic>
+    </p:spTree>
+    <p:extLst>
+      <p:ext uri="{BB962C8B-B14F-4D97-AF65-F5344CB8AC3E}">
+        <p14:creationId xmlns:p14="http://schemas.microsoft.com/office/powerpoint/2010/main" val="3389936297"/>
+      </p:ext>
+    </p:extLst>
+  </p:cSld>
+  <p:clrMapOvr>
+    <a:masterClrMapping/>
+  </p:clrMapOvr>
+</p:sld>
+</file>
+
+<file path=ppt/slides/slide21.xml><?xml version="1.0" encoding="utf-8"?>
+<p:sld xmlns:a="http://schemas.openxmlformats.org/drawingml/2006/main" xmlns:r="http://schemas.openxmlformats.org/officeDocument/2006/relationships" xmlns:p="http://schemas.openxmlformats.org/presentationml/2006/main">
+  <p:cSld>
+    <p:bg>
+      <p:bgPr>
+        <a:blipFill dpi="0" rotWithShape="0">
+          <a:blip r:embed="rId2" cstate="print"/>
+          <a:srcRect/>
+          <a:stretch>
+            <a:fillRect/>
+          </a:stretch>
+        </a:blipFill>
+        <a:effectLst/>
+      </p:bgPr>
+    </p:bg>
+    <p:spTree>
+      <p:nvGrpSpPr>
+        <p:cNvPr id="1" name=""/>
+        <p:cNvGrpSpPr/>
+        <p:nvPr/>
+      </p:nvGrpSpPr>
+      <p:grpSpPr>
+        <a:xfrm>
+          <a:off x="0" y="0"/>
+          <a:ext cx="0" cy="0"/>
+          <a:chOff x="0" y="0"/>
+          <a:chExt cx="0" cy="0"/>
+        </a:xfrm>
+      </p:grpSpPr>
+      <p:sp>
+        <p:nvSpPr>
+          <p:cNvPr id="4098" name="Titre 3"/>
+          <p:cNvSpPr>
+            <a:spLocks noGrp="1"/>
+          </p:cNvSpPr>
+          <p:nvPr>
+            <p:ph type="title"/>
+          </p:nvPr>
+        </p:nvSpPr>
+        <p:spPr>
+          <a:xfrm>
+            <a:off x="228600" y="274638"/>
+            <a:ext cx="8686800" cy="1143000"/>
+          </a:xfrm>
+        </p:spPr>
+        <p:txBody>
+          <a:bodyPr/>
+          <a:lstStyle/>
+          <a:p>
+            <a:pPr lvl="1"/>
+            <a:r>
+              <a:rPr lang="en-US" sz="3200" dirty="0">
+                <a:solidFill>
+                  <a:schemeClr val="bg1"/>
+                </a:solidFill>
+              </a:rPr>
+              <a:t>Rule API (cont.)</a:t>
+            </a:r>
+            <a:endParaRPr lang="fr-CA" sz="3000" dirty="0">
+              <a:solidFill>
+                <a:schemeClr val="bg1"/>
+              </a:solidFill>
+            </a:endParaRPr>
+          </a:p>
+        </p:txBody>
+      </p:sp>
+      <p:sp>
+        <p:nvSpPr>
+          <p:cNvPr id="4099" name="Espace réservé du contenu 4"/>
+          <p:cNvSpPr>
+            <a:spLocks noGrp="1"/>
+          </p:cNvSpPr>
+          <p:nvPr>
+            <p:ph idx="1"/>
+          </p:nvPr>
+        </p:nvSpPr>
+        <p:spPr>
+          <a:xfrm>
+            <a:off x="76200" y="1981200"/>
+            <a:ext cx="8001000" cy="838200"/>
+          </a:xfrm>
+        </p:spPr>
+        <p:txBody>
+          <a:bodyPr/>
+          <a:lstStyle/>
+          <a:p>
+            <a:r>
+              <a:rPr lang="en-US" sz="1400" b="1" dirty="0">
+                <a:solidFill>
+                  <a:srgbClr val="3C5790"/>
+                </a:solidFill>
+              </a:rPr>
+              <a:t>The </a:t>
+            </a:r>
+            <a:r>
+              <a:rPr lang="en-US" sz="1400" b="1" dirty="0" err="1">
+                <a:solidFill>
+                  <a:srgbClr val="3C5790"/>
+                </a:solidFill>
+              </a:rPr>
+              <a:t>ExpectedException</a:t>
+            </a:r>
+            <a:r>
+              <a:rPr lang="en-US" sz="1400" b="1" dirty="0">
+                <a:solidFill>
+                  <a:srgbClr val="3C5790"/>
+                </a:solidFill>
+              </a:rPr>
+              <a:t> Rule</a:t>
+            </a:r>
+          </a:p>
+          <a:p>
+            <a:r>
+              <a:rPr lang="en-US" sz="1400" dirty="0">
+                <a:solidFill>
+                  <a:srgbClr val="3C5790"/>
+                </a:solidFill>
+              </a:rPr>
+              <a:t>We can use the </a:t>
+            </a:r>
+            <a:r>
+              <a:rPr lang="en-US" sz="1400" dirty="0" err="1">
+                <a:solidFill>
+                  <a:srgbClr val="3C5790"/>
+                </a:solidFill>
+              </a:rPr>
+              <a:t>ExpectedException</a:t>
+            </a:r>
+            <a:r>
+              <a:rPr lang="en-US" sz="1400" dirty="0">
+                <a:solidFill>
+                  <a:srgbClr val="3C5790"/>
+                </a:solidFill>
+              </a:rPr>
+              <a:t> rule to verify that some code throws an expected exception.</a:t>
+            </a:r>
+          </a:p>
+        </p:txBody>
+      </p:sp>
+      <p:pic>
+        <p:nvPicPr>
+          <p:cNvPr id="2" name="Picture 1">
+            <a:extLst>
+              <a:ext uri="{FF2B5EF4-FFF2-40B4-BE49-F238E27FC236}">
+                <a16:creationId xmlns:a16="http://schemas.microsoft.com/office/drawing/2014/main" id="{E2AC8ADA-8EA8-41D0-B941-66F3710AA099}"/>
+              </a:ext>
+            </a:extLst>
+          </p:cNvPr>
+          <p:cNvPicPr>
+            <a:picLocks noChangeAspect="1"/>
+          </p:cNvPicPr>
+          <p:nvPr/>
+        </p:nvPicPr>
+        <p:blipFill>
+          <a:blip r:embed="rId3"/>
+          <a:stretch>
+            <a:fillRect/>
+          </a:stretch>
+        </p:blipFill>
+        <p:spPr>
+          <a:xfrm>
+            <a:off x="762000" y="3200400"/>
+            <a:ext cx="7315200" cy="2073779"/>
+          </a:xfrm>
+          <a:prstGeom prst="rect">
+            <a:avLst/>
+          </a:prstGeom>
+        </p:spPr>
+      </p:pic>
+    </p:spTree>
+    <p:extLst>
+      <p:ext uri="{BB962C8B-B14F-4D97-AF65-F5344CB8AC3E}">
+        <p14:creationId xmlns:p14="http://schemas.microsoft.com/office/powerpoint/2010/main" val="3804413929"/>
+      </p:ext>
+    </p:extLst>
+  </p:cSld>
+  <p:clrMapOvr>
+    <a:masterClrMapping/>
+  </p:clrMapOvr>
+</p:sld>
+</file>
+
+<file path=ppt/slides/slide22.xml><?xml version="1.0" encoding="utf-8"?>
+<p:sld xmlns:a="http://schemas.openxmlformats.org/drawingml/2006/main" xmlns:r="http://schemas.openxmlformats.org/officeDocument/2006/relationships" xmlns:p="http://schemas.openxmlformats.org/presentationml/2006/main">
+  <p:cSld>
+    <p:bg>
+      <p:bgPr>
+        <a:blipFill dpi="0" rotWithShape="0">
+          <a:blip r:embed="rId2" cstate="print"/>
+          <a:srcRect/>
+          <a:stretch>
+            <a:fillRect/>
+          </a:stretch>
+        </a:blipFill>
+        <a:effectLst/>
+      </p:bgPr>
+    </p:bg>
+    <p:spTree>
+      <p:nvGrpSpPr>
+        <p:cNvPr id="1" name=""/>
+        <p:cNvGrpSpPr/>
+        <p:nvPr/>
+      </p:nvGrpSpPr>
+      <p:grpSpPr>
+        <a:xfrm>
+          <a:off x="0" y="0"/>
+          <a:ext cx="0" cy="0"/>
+          <a:chOff x="0" y="0"/>
+          <a:chExt cx="0" cy="0"/>
+        </a:xfrm>
+      </p:grpSpPr>
+      <p:sp>
+        <p:nvSpPr>
+          <p:cNvPr id="4098" name="Titre 3"/>
+          <p:cNvSpPr>
+            <a:spLocks noGrp="1"/>
+          </p:cNvSpPr>
+          <p:nvPr>
+            <p:ph type="title"/>
+          </p:nvPr>
+        </p:nvSpPr>
+        <p:spPr>
+          <a:xfrm>
+            <a:off x="228600" y="274638"/>
+            <a:ext cx="8686800" cy="1143000"/>
+          </a:xfrm>
+        </p:spPr>
+        <p:txBody>
+          <a:bodyPr/>
+          <a:lstStyle/>
+          <a:p>
+            <a:pPr lvl="1"/>
+            <a:r>
+              <a:rPr lang="en-US" sz="3200" dirty="0">
+                <a:solidFill>
+                  <a:schemeClr val="bg1"/>
+                </a:solidFill>
+              </a:rPr>
+              <a:t>Rule API (cont.)</a:t>
+            </a:r>
+            <a:endParaRPr lang="fr-CA" sz="3000" dirty="0">
+              <a:solidFill>
+                <a:schemeClr val="bg1"/>
+              </a:solidFill>
+            </a:endParaRPr>
+          </a:p>
+        </p:txBody>
+      </p:sp>
+      <p:sp>
+        <p:nvSpPr>
+          <p:cNvPr id="4099" name="Espace réservé du contenu 4"/>
+          <p:cNvSpPr>
+            <a:spLocks noGrp="1"/>
+          </p:cNvSpPr>
+          <p:nvPr>
+            <p:ph idx="1"/>
+          </p:nvPr>
+        </p:nvSpPr>
+        <p:spPr>
+          <a:xfrm>
+            <a:off x="76200" y="1981200"/>
+            <a:ext cx="8001000" cy="838200"/>
+          </a:xfrm>
+        </p:spPr>
+        <p:txBody>
+          <a:bodyPr/>
+          <a:lstStyle/>
+          <a:p>
+            <a:r>
+              <a:rPr lang="en-US" sz="1400" b="1" dirty="0">
+                <a:solidFill>
+                  <a:srgbClr val="3C5790"/>
+                </a:solidFill>
+              </a:rPr>
+              <a:t>The </a:t>
+            </a:r>
+            <a:r>
+              <a:rPr lang="en-US" sz="1400" b="1" dirty="0" err="1">
+                <a:solidFill>
+                  <a:srgbClr val="3C5790"/>
+                </a:solidFill>
+              </a:rPr>
+              <a:t>TestName</a:t>
+            </a:r>
+            <a:r>
+              <a:rPr lang="en-US" sz="1400" b="1" dirty="0">
+                <a:solidFill>
+                  <a:srgbClr val="3C5790"/>
+                </a:solidFill>
+              </a:rPr>
+              <a:t> Rule</a:t>
+            </a:r>
+          </a:p>
+          <a:p>
+            <a:r>
+              <a:rPr lang="en-US" sz="1400" dirty="0">
+                <a:solidFill>
+                  <a:srgbClr val="3C5790"/>
+                </a:solidFill>
+              </a:rPr>
+              <a:t>The </a:t>
+            </a:r>
+            <a:r>
+              <a:rPr lang="en-US" sz="1400" dirty="0" err="1">
+                <a:solidFill>
+                  <a:srgbClr val="3C5790"/>
+                </a:solidFill>
+              </a:rPr>
+              <a:t>TestName</a:t>
+            </a:r>
+            <a:r>
+              <a:rPr lang="en-US" sz="1400" dirty="0">
+                <a:solidFill>
+                  <a:srgbClr val="3C5790"/>
+                </a:solidFill>
+              </a:rPr>
+              <a:t> rule provides the current test name inside a given test method</a:t>
+            </a:r>
+          </a:p>
+          <a:p>
+            <a:endParaRPr lang="en-US" sz="1400" dirty="0">
+              <a:solidFill>
+                <a:srgbClr val="3C5790"/>
+              </a:solidFill>
+            </a:endParaRPr>
+          </a:p>
+        </p:txBody>
+      </p:sp>
+      <p:pic>
+        <p:nvPicPr>
+          <p:cNvPr id="2" name="Picture 1">
+            <a:extLst>
+              <a:ext uri="{FF2B5EF4-FFF2-40B4-BE49-F238E27FC236}">
+                <a16:creationId xmlns:a16="http://schemas.microsoft.com/office/drawing/2014/main" id="{303C2B67-1DEC-49B0-8EC2-3818E3856F8C}"/>
+              </a:ext>
+            </a:extLst>
+          </p:cNvPr>
+          <p:cNvPicPr>
+            <a:picLocks noChangeAspect="1"/>
+          </p:cNvPicPr>
+          <p:nvPr/>
+        </p:nvPicPr>
+        <p:blipFill>
+          <a:blip r:embed="rId3"/>
+          <a:stretch>
+            <a:fillRect/>
+          </a:stretch>
+        </p:blipFill>
+        <p:spPr>
+          <a:xfrm>
+            <a:off x="1447800" y="3505200"/>
+            <a:ext cx="5876925" cy="1685925"/>
+          </a:xfrm>
+          <a:prstGeom prst="rect">
+            <a:avLst/>
+          </a:prstGeom>
+        </p:spPr>
+      </p:pic>
+    </p:spTree>
+    <p:extLst>
+      <p:ext uri="{BB962C8B-B14F-4D97-AF65-F5344CB8AC3E}">
+        <p14:creationId xmlns:p14="http://schemas.microsoft.com/office/powerpoint/2010/main" val="632678133"/>
+      </p:ext>
+    </p:extLst>
+  </p:cSld>
+  <p:clrMapOvr>
+    <a:masterClrMapping/>
+  </p:clrMapOvr>
+</p:sld>
+</file>
+
+<file path=ppt/slides/slide23.xml><?xml version="1.0" encoding="utf-8"?>
+<p:sld xmlns:a="http://schemas.openxmlformats.org/drawingml/2006/main" xmlns:r="http://schemas.openxmlformats.org/officeDocument/2006/relationships" xmlns:p="http://schemas.openxmlformats.org/presentationml/2006/main">
+  <p:cSld>
+    <p:bg>
+      <p:bgPr>
+        <a:blipFill dpi="0" rotWithShape="0">
+          <a:blip r:embed="rId2" cstate="print"/>
+          <a:srcRect/>
+          <a:stretch>
+            <a:fillRect/>
+          </a:stretch>
+        </a:blipFill>
+        <a:effectLst/>
+      </p:bgPr>
+    </p:bg>
+    <p:spTree>
+      <p:nvGrpSpPr>
+        <p:cNvPr id="1" name=""/>
+        <p:cNvGrpSpPr/>
+        <p:nvPr/>
+      </p:nvGrpSpPr>
+      <p:grpSpPr>
+        <a:xfrm>
+          <a:off x="0" y="0"/>
+          <a:ext cx="0" cy="0"/>
+          <a:chOff x="0" y="0"/>
+          <a:chExt cx="0" cy="0"/>
+        </a:xfrm>
+      </p:grpSpPr>
+      <p:sp>
+        <p:nvSpPr>
+          <p:cNvPr id="4098" name="Titre 3"/>
+          <p:cNvSpPr>
+            <a:spLocks noGrp="1"/>
+          </p:cNvSpPr>
+          <p:nvPr>
+            <p:ph type="title"/>
+          </p:nvPr>
+        </p:nvSpPr>
+        <p:spPr>
+          <a:xfrm>
+            <a:off x="228600" y="274638"/>
+            <a:ext cx="8686800" cy="1143000"/>
+          </a:xfrm>
+        </p:spPr>
+        <p:txBody>
+          <a:bodyPr/>
+          <a:lstStyle/>
+          <a:p>
+            <a:pPr lvl="1"/>
+            <a:r>
+              <a:rPr lang="en-US" sz="3200" dirty="0">
+                <a:solidFill>
+                  <a:schemeClr val="bg1"/>
+                </a:solidFill>
+              </a:rPr>
+              <a:t>Rule API (cont.)</a:t>
+            </a:r>
+            <a:endParaRPr lang="fr-CA" sz="3000" dirty="0">
+              <a:solidFill>
+                <a:schemeClr val="bg1"/>
+              </a:solidFill>
+            </a:endParaRPr>
+          </a:p>
+        </p:txBody>
+      </p:sp>
+      <p:sp>
+        <p:nvSpPr>
+          <p:cNvPr id="4099" name="Espace réservé du contenu 4"/>
+          <p:cNvSpPr>
+            <a:spLocks noGrp="1"/>
+          </p:cNvSpPr>
+          <p:nvPr>
+            <p:ph idx="1"/>
+          </p:nvPr>
+        </p:nvSpPr>
+        <p:spPr>
+          <a:xfrm>
+            <a:off x="76200" y="1981200"/>
+            <a:ext cx="8001000" cy="990600"/>
+          </a:xfrm>
+        </p:spPr>
+        <p:txBody>
+          <a:bodyPr/>
+          <a:lstStyle/>
+          <a:p>
+            <a:r>
+              <a:rPr lang="en-US" sz="1400" b="1" dirty="0">
+                <a:solidFill>
+                  <a:srgbClr val="3C5790"/>
+                </a:solidFill>
+              </a:rPr>
+              <a:t>The Timeout Rule</a:t>
+            </a:r>
+            <a:endParaRPr lang="en-US" sz="1400" dirty="0">
+              <a:solidFill>
+                <a:srgbClr val="3C5790"/>
+              </a:solidFill>
+            </a:endParaRPr>
+          </a:p>
+          <a:p>
+            <a:r>
+              <a:rPr lang="en-US" sz="1400" dirty="0">
+                <a:solidFill>
+                  <a:srgbClr val="3C5790"/>
+                </a:solidFill>
+              </a:rPr>
+              <a:t>The Timeout rule represents an alternative to using the timeout parameter.</a:t>
+            </a:r>
+          </a:p>
+        </p:txBody>
+      </p:sp>
+      <p:pic>
+        <p:nvPicPr>
+          <p:cNvPr id="2" name="Picture 1">
+            <a:extLst>
+              <a:ext uri="{FF2B5EF4-FFF2-40B4-BE49-F238E27FC236}">
+                <a16:creationId xmlns:a16="http://schemas.microsoft.com/office/drawing/2014/main" id="{C5323B4C-0529-4076-A406-B5A2187366C2}"/>
+              </a:ext>
+            </a:extLst>
+          </p:cNvPr>
+          <p:cNvPicPr>
+            <a:picLocks noChangeAspect="1"/>
+          </p:cNvPicPr>
+          <p:nvPr/>
+        </p:nvPicPr>
+        <p:blipFill>
+          <a:blip r:embed="rId3"/>
+          <a:stretch>
+            <a:fillRect/>
+          </a:stretch>
+        </p:blipFill>
+        <p:spPr>
+          <a:xfrm>
+            <a:off x="2209800" y="3657600"/>
+            <a:ext cx="5257800" cy="1519833"/>
+          </a:xfrm>
+          <a:prstGeom prst="rect">
+            <a:avLst/>
+          </a:prstGeom>
+        </p:spPr>
+      </p:pic>
+    </p:spTree>
+    <p:extLst>
+      <p:ext uri="{BB962C8B-B14F-4D97-AF65-F5344CB8AC3E}">
+        <p14:creationId xmlns:p14="http://schemas.microsoft.com/office/powerpoint/2010/main" val="113385462"/>
+      </p:ext>
+    </p:extLst>
+  </p:cSld>
+  <p:clrMapOvr>
+    <a:masterClrMapping/>
+  </p:clrMapOvr>
+</p:sld>
+</file>
+
+<file path=ppt/slides/slide24.xml><?xml version="1.0" encoding="utf-8"?>
+<p:sld xmlns:a="http://schemas.openxmlformats.org/drawingml/2006/main" xmlns:r="http://schemas.openxmlformats.org/officeDocument/2006/relationships" xmlns:p="http://schemas.openxmlformats.org/presentationml/2006/main">
+  <p:cSld>
+    <p:bg>
+      <p:bgPr>
+        <a:blipFill dpi="0" rotWithShape="0">
+          <a:blip r:embed="rId2" cstate="print"/>
+          <a:srcRect/>
+          <a:stretch>
+            <a:fillRect/>
+          </a:stretch>
+        </a:blipFill>
+        <a:effectLst/>
+      </p:bgPr>
+    </p:bg>
+    <p:spTree>
+      <p:nvGrpSpPr>
+        <p:cNvPr id="1" name=""/>
+        <p:cNvGrpSpPr/>
+        <p:nvPr/>
+      </p:nvGrpSpPr>
+      <p:grpSpPr>
+        <a:xfrm>
+          <a:off x="0" y="0"/>
+          <a:ext cx="0" cy="0"/>
+          <a:chOff x="0" y="0"/>
+          <a:chExt cx="0" cy="0"/>
+        </a:xfrm>
+      </p:grpSpPr>
+      <p:sp>
+        <p:nvSpPr>
+          <p:cNvPr id="4098" name="Titre 3"/>
+          <p:cNvSpPr>
+            <a:spLocks noGrp="1"/>
+          </p:cNvSpPr>
+          <p:nvPr>
+            <p:ph type="title"/>
+          </p:nvPr>
+        </p:nvSpPr>
+        <p:spPr>
+          <a:xfrm>
+            <a:off x="228600" y="274638"/>
+            <a:ext cx="8686800" cy="1143000"/>
+          </a:xfrm>
+        </p:spPr>
+        <p:txBody>
+          <a:bodyPr/>
+          <a:lstStyle/>
+          <a:p>
+            <a:pPr lvl="1"/>
+            <a:r>
+              <a:rPr lang="en-US" sz="3200" dirty="0">
+                <a:solidFill>
+                  <a:schemeClr val="bg1"/>
+                </a:solidFill>
+              </a:rPr>
+              <a:t>Rule API (cont.)</a:t>
+            </a:r>
+            <a:endParaRPr lang="fr-CA" sz="3000" dirty="0">
+              <a:solidFill>
+                <a:schemeClr val="bg1"/>
+              </a:solidFill>
+            </a:endParaRPr>
+          </a:p>
+        </p:txBody>
+      </p:sp>
+      <p:sp>
+        <p:nvSpPr>
+          <p:cNvPr id="4099" name="Espace réservé du contenu 4"/>
+          <p:cNvSpPr>
+            <a:spLocks noGrp="1"/>
+          </p:cNvSpPr>
+          <p:nvPr>
+            <p:ph idx="1"/>
+          </p:nvPr>
+        </p:nvSpPr>
+        <p:spPr>
+          <a:xfrm>
+            <a:off x="76200" y="1981200"/>
+            <a:ext cx="8001000" cy="838200"/>
+          </a:xfrm>
+        </p:spPr>
+        <p:txBody>
+          <a:bodyPr/>
+          <a:lstStyle/>
+          <a:p>
+            <a:r>
+              <a:rPr lang="en-US" sz="1400" b="1" dirty="0">
+                <a:solidFill>
+                  <a:srgbClr val="3C5790"/>
+                </a:solidFill>
+              </a:rPr>
+              <a:t>The </a:t>
+            </a:r>
+            <a:r>
+              <a:rPr lang="en-US" sz="1400" b="1" dirty="0" err="1">
+                <a:solidFill>
+                  <a:srgbClr val="3C5790"/>
+                </a:solidFill>
+              </a:rPr>
+              <a:t>ErrorCollector</a:t>
+            </a:r>
+            <a:r>
+              <a:rPr lang="en-US" sz="1400" b="1" dirty="0">
+                <a:solidFill>
+                  <a:srgbClr val="3C5790"/>
+                </a:solidFill>
+              </a:rPr>
+              <a:t> Rule</a:t>
+            </a:r>
+          </a:p>
+          <a:p>
+            <a:r>
+              <a:rPr lang="en-US" sz="1400" dirty="0">
+                <a:solidFill>
+                  <a:srgbClr val="3C5790"/>
+                </a:solidFill>
+              </a:rPr>
+              <a:t>This rule allows the execution of a test to continue after the first problem is found</a:t>
+            </a:r>
+          </a:p>
+          <a:p>
+            <a:r>
+              <a:rPr lang="en-US" sz="1400" dirty="0">
+                <a:solidFill>
+                  <a:srgbClr val="3C5790"/>
+                </a:solidFill>
+              </a:rPr>
+              <a:t>When the test run, the execution continues, but the test will fail at the end.</a:t>
+            </a:r>
+          </a:p>
+        </p:txBody>
+      </p:sp>
+      <p:pic>
+        <p:nvPicPr>
+          <p:cNvPr id="2" name="Picture 1">
+            <a:extLst>
+              <a:ext uri="{FF2B5EF4-FFF2-40B4-BE49-F238E27FC236}">
+                <a16:creationId xmlns:a16="http://schemas.microsoft.com/office/drawing/2014/main" id="{822421C3-80D6-4587-83D5-56CFAE781EA4}"/>
+              </a:ext>
+            </a:extLst>
+          </p:cNvPr>
+          <p:cNvPicPr>
+            <a:picLocks noChangeAspect="1"/>
+          </p:cNvPicPr>
+          <p:nvPr/>
+        </p:nvPicPr>
+        <p:blipFill>
+          <a:blip r:embed="rId3"/>
+          <a:stretch>
+            <a:fillRect/>
+          </a:stretch>
+        </p:blipFill>
+        <p:spPr>
+          <a:xfrm>
+            <a:off x="1600200" y="3581400"/>
+            <a:ext cx="6203521" cy="1581150"/>
+          </a:xfrm>
+          <a:prstGeom prst="rect">
+            <a:avLst/>
+          </a:prstGeom>
+        </p:spPr>
+      </p:pic>
+    </p:spTree>
+    <p:extLst>
+      <p:ext uri="{BB962C8B-B14F-4D97-AF65-F5344CB8AC3E}">
+        <p14:creationId xmlns:p14="http://schemas.microsoft.com/office/powerpoint/2010/main" val="3912600119"/>
+      </p:ext>
+    </p:extLst>
+  </p:cSld>
+  <p:clrMapOvr>
+    <a:masterClrMapping/>
+  </p:clrMapOvr>
+</p:sld>
+</file>
+
+<file path=ppt/slides/slide25.xml><?xml version="1.0" encoding="utf-8"?>
+<p:sld xmlns:a="http://schemas.openxmlformats.org/drawingml/2006/main" xmlns:r="http://schemas.openxmlformats.org/officeDocument/2006/relationships" xmlns:p="http://schemas.openxmlformats.org/presentationml/2006/main">
+  <p:cSld>
+    <p:bg>
+      <p:bgPr>
+        <a:blipFill dpi="0" rotWithShape="0">
+          <a:blip r:embed="rId2" cstate="print"/>
+          <a:srcRect/>
+          <a:stretch>
+            <a:fillRect/>
+          </a:stretch>
+        </a:blipFill>
+        <a:effectLst/>
+      </p:bgPr>
+    </p:bg>
+    <p:spTree>
+      <p:nvGrpSpPr>
+        <p:cNvPr id="1" name=""/>
+        <p:cNvGrpSpPr/>
+        <p:nvPr/>
+      </p:nvGrpSpPr>
+      <p:grpSpPr>
+        <a:xfrm>
+          <a:off x="0" y="0"/>
+          <a:ext cx="0" cy="0"/>
+          <a:chOff x="0" y="0"/>
+          <a:chExt cx="0" cy="0"/>
+        </a:xfrm>
+      </p:grpSpPr>
+      <p:sp>
+        <p:nvSpPr>
+          <p:cNvPr id="4098" name="Titre 3"/>
+          <p:cNvSpPr>
+            <a:spLocks noGrp="1"/>
+          </p:cNvSpPr>
+          <p:nvPr>
+            <p:ph type="title"/>
+          </p:nvPr>
+        </p:nvSpPr>
+        <p:spPr>
+          <a:xfrm>
+            <a:off x="228600" y="274638"/>
+            <a:ext cx="8686800" cy="1143000"/>
+          </a:xfrm>
+        </p:spPr>
+        <p:txBody>
+          <a:bodyPr/>
+          <a:lstStyle/>
+          <a:p>
+            <a:pPr lvl="1"/>
+            <a:r>
+              <a:rPr lang="en-US" sz="3200" dirty="0">
+                <a:solidFill>
+                  <a:schemeClr val="bg1"/>
+                </a:solidFill>
+              </a:rPr>
+              <a:t>Rule API (cont.)</a:t>
+            </a:r>
+            <a:endParaRPr lang="fr-CA" sz="3000" dirty="0">
+              <a:solidFill>
+                <a:schemeClr val="bg1"/>
+              </a:solidFill>
+            </a:endParaRPr>
+          </a:p>
+        </p:txBody>
+      </p:sp>
+      <p:sp>
+        <p:nvSpPr>
+          <p:cNvPr id="4099" name="Espace réservé du contenu 4"/>
+          <p:cNvSpPr>
+            <a:spLocks noGrp="1"/>
+          </p:cNvSpPr>
+          <p:nvPr>
+            <p:ph idx="1"/>
+          </p:nvPr>
+        </p:nvSpPr>
+        <p:spPr>
+          <a:xfrm>
+            <a:off x="76200" y="1981200"/>
+            <a:ext cx="8001000" cy="838200"/>
+          </a:xfrm>
+        </p:spPr>
+        <p:txBody>
+          <a:bodyPr/>
+          <a:lstStyle/>
+          <a:p>
+            <a:r>
+              <a:rPr lang="en-US" sz="1400" b="1" dirty="0">
+                <a:solidFill>
+                  <a:srgbClr val="3C5790"/>
+                </a:solidFill>
+              </a:rPr>
+              <a:t>The Verifier Rule</a:t>
+            </a:r>
+          </a:p>
+          <a:p>
+            <a:r>
+              <a:rPr lang="en-US" sz="1400" dirty="0">
+                <a:solidFill>
+                  <a:srgbClr val="3C5790"/>
+                </a:solidFill>
+              </a:rPr>
+              <a:t>The Verifier rule is an abstract class that we can use to verify additional behavior</a:t>
+            </a:r>
+          </a:p>
+        </p:txBody>
+      </p:sp>
+      <p:pic>
+        <p:nvPicPr>
+          <p:cNvPr id="3" name="Picture 2">
+            <a:extLst>
+              <a:ext uri="{FF2B5EF4-FFF2-40B4-BE49-F238E27FC236}">
+                <a16:creationId xmlns:a16="http://schemas.microsoft.com/office/drawing/2014/main" id="{E5A9BD61-1BBA-486D-A112-067AA9BF52E2}"/>
+              </a:ext>
+            </a:extLst>
+          </p:cNvPr>
+          <p:cNvPicPr>
+            <a:picLocks noChangeAspect="1"/>
+          </p:cNvPicPr>
+          <p:nvPr/>
+        </p:nvPicPr>
+        <p:blipFill>
+          <a:blip r:embed="rId3"/>
+          <a:stretch>
+            <a:fillRect/>
+          </a:stretch>
+        </p:blipFill>
+        <p:spPr>
+          <a:xfrm>
+            <a:off x="1447800" y="2967036"/>
+            <a:ext cx="6781800" cy="2119313"/>
+          </a:xfrm>
+          <a:prstGeom prst="rect">
+            <a:avLst/>
+          </a:prstGeom>
+        </p:spPr>
+      </p:pic>
+    </p:spTree>
+    <p:extLst>
+      <p:ext uri="{BB962C8B-B14F-4D97-AF65-F5344CB8AC3E}">
+        <p14:creationId xmlns:p14="http://schemas.microsoft.com/office/powerpoint/2010/main" val="1048861706"/>
+      </p:ext>
+    </p:extLst>
+  </p:cSld>
+  <p:clrMapOvr>
+    <a:masterClrMapping/>
+  </p:clrMapOvr>
+</p:sld>
+</file>
+
+<file path=ppt/slides/slide26.xml><?xml version="1.0" encoding="utf-8"?>
+<p:sld xmlns:a="http://schemas.openxmlformats.org/drawingml/2006/main" xmlns:r="http://schemas.openxmlformats.org/officeDocument/2006/relationships" xmlns:p="http://schemas.openxmlformats.org/presentationml/2006/main">
+  <p:cSld>
+    <p:bg>
+      <p:bgPr>
+        <a:blipFill dpi="0" rotWithShape="0">
+          <a:blip r:embed="rId2" cstate="print"/>
+          <a:srcRect/>
+          <a:stretch>
+            <a:fillRect/>
+          </a:stretch>
+        </a:blipFill>
+        <a:effectLst/>
+      </p:bgPr>
+    </p:bg>
+    <p:spTree>
+      <p:nvGrpSpPr>
+        <p:cNvPr id="1" name=""/>
+        <p:cNvGrpSpPr/>
+        <p:nvPr/>
+      </p:nvGrpSpPr>
+      <p:grpSpPr>
+        <a:xfrm>
+          <a:off x="0" y="0"/>
+          <a:ext cx="0" cy="0"/>
+          <a:chOff x="0" y="0"/>
+          <a:chExt cx="0" cy="0"/>
+        </a:xfrm>
+      </p:grpSpPr>
+      <p:sp>
+        <p:nvSpPr>
+          <p:cNvPr id="4098" name="Titre 3"/>
+          <p:cNvSpPr>
+            <a:spLocks noGrp="1"/>
+          </p:cNvSpPr>
+          <p:nvPr>
+            <p:ph type="title"/>
+          </p:nvPr>
+        </p:nvSpPr>
+        <p:spPr>
+          <a:xfrm>
+            <a:off x="228600" y="274638"/>
+            <a:ext cx="8686800" cy="1143000"/>
+          </a:xfrm>
+        </p:spPr>
+        <p:txBody>
+          <a:bodyPr/>
+          <a:lstStyle/>
+          <a:p>
+            <a:pPr lvl="1"/>
+            <a:r>
+              <a:rPr lang="en-US" sz="3200" dirty="0">
+                <a:solidFill>
+                  <a:schemeClr val="bg1"/>
+                </a:solidFill>
+              </a:rPr>
+              <a:t>Rule API (cont.)</a:t>
+            </a:r>
+            <a:endParaRPr lang="fr-CA" sz="3000" dirty="0">
+              <a:solidFill>
+                <a:schemeClr val="bg1"/>
+              </a:solidFill>
+            </a:endParaRPr>
+          </a:p>
+        </p:txBody>
+      </p:sp>
+      <p:sp>
+        <p:nvSpPr>
+          <p:cNvPr id="4099" name="Espace réservé du contenu 4"/>
+          <p:cNvSpPr>
+            <a:spLocks noGrp="1"/>
+          </p:cNvSpPr>
+          <p:nvPr>
+            <p:ph idx="1"/>
+          </p:nvPr>
+        </p:nvSpPr>
+        <p:spPr>
+          <a:xfrm>
+            <a:off x="76200" y="1981200"/>
+            <a:ext cx="8001000" cy="1524000"/>
+          </a:xfrm>
+        </p:spPr>
+        <p:txBody>
+          <a:bodyPr/>
+          <a:lstStyle/>
+          <a:p>
+            <a:r>
+              <a:rPr lang="en-US" sz="1400" b="1" dirty="0">
+                <a:solidFill>
+                  <a:srgbClr val="3C5790"/>
+                </a:solidFill>
+              </a:rPr>
+              <a:t>The </a:t>
+            </a:r>
+            <a:r>
+              <a:rPr lang="en-US" sz="1400" b="1" dirty="0" err="1">
+                <a:solidFill>
+                  <a:srgbClr val="3C5790"/>
+                </a:solidFill>
+              </a:rPr>
+              <a:t>DisableOnDebug</a:t>
+            </a:r>
+            <a:r>
+              <a:rPr lang="en-US" sz="1400" b="1" dirty="0">
+                <a:solidFill>
+                  <a:srgbClr val="3C5790"/>
+                </a:solidFill>
+              </a:rPr>
+              <a:t> Rule</a:t>
+            </a:r>
+          </a:p>
+          <a:p>
+            <a:r>
+              <a:rPr lang="en-US" sz="1400" dirty="0">
+                <a:solidFill>
+                  <a:srgbClr val="3C5790"/>
+                </a:solidFill>
+              </a:rPr>
+              <a:t>Sometimes we may need to disable a rule when we're debugging, like Timeout rule.</a:t>
+            </a:r>
+          </a:p>
+          <a:p>
+            <a:endParaRPr lang="en-US" sz="1400" dirty="0">
+              <a:solidFill>
+                <a:srgbClr val="3C5790"/>
+              </a:solidFill>
+            </a:endParaRPr>
+          </a:p>
+          <a:p>
+            <a:r>
+              <a:rPr lang="en-US" sz="1400" dirty="0">
+                <a:solidFill>
+                  <a:srgbClr val="3C5790"/>
+                </a:solidFill>
+              </a:rPr>
+              <a:t>@Rule</a:t>
+            </a:r>
+          </a:p>
+          <a:p>
+            <a:r>
+              <a:rPr lang="en-US" sz="1400" dirty="0">
+                <a:solidFill>
+                  <a:srgbClr val="3C5790"/>
+                </a:solidFill>
+              </a:rPr>
+              <a:t>public </a:t>
+            </a:r>
+            <a:r>
+              <a:rPr lang="en-US" sz="1400" dirty="0" err="1">
+                <a:solidFill>
+                  <a:srgbClr val="3C5790"/>
+                </a:solidFill>
+              </a:rPr>
+              <a:t>DisableOnDebug</a:t>
+            </a:r>
+            <a:r>
+              <a:rPr lang="en-US" sz="1400" dirty="0">
+                <a:solidFill>
+                  <a:srgbClr val="3C5790"/>
+                </a:solidFill>
+              </a:rPr>
+              <a:t> </a:t>
+            </a:r>
+            <a:r>
+              <a:rPr lang="en-US" sz="1400" dirty="0" err="1">
+                <a:solidFill>
+                  <a:srgbClr val="3C5790"/>
+                </a:solidFill>
+              </a:rPr>
+              <a:t>disableTimeout</a:t>
+            </a:r>
+            <a:r>
+              <a:rPr lang="en-US" sz="1400" dirty="0">
+                <a:solidFill>
+                  <a:srgbClr val="3C5790"/>
+                </a:solidFill>
+              </a:rPr>
+              <a:t> = new </a:t>
+            </a:r>
+            <a:r>
+              <a:rPr lang="en-US" sz="1400" dirty="0" err="1">
+                <a:solidFill>
+                  <a:srgbClr val="3C5790"/>
+                </a:solidFill>
+              </a:rPr>
+              <a:t>DisableOnDebug</a:t>
+            </a:r>
+            <a:r>
+              <a:rPr lang="en-US" sz="1400" dirty="0">
+                <a:solidFill>
+                  <a:srgbClr val="3C5790"/>
+                </a:solidFill>
+              </a:rPr>
+              <a:t>(</a:t>
+            </a:r>
+            <a:r>
+              <a:rPr lang="en-US" sz="1400" dirty="0" err="1">
+                <a:solidFill>
+                  <a:srgbClr val="3C5790"/>
+                </a:solidFill>
+              </a:rPr>
+              <a:t>Timeout.seconds</a:t>
+            </a:r>
+            <a:r>
+              <a:rPr lang="en-US" sz="1400" dirty="0">
+                <a:solidFill>
+                  <a:srgbClr val="3C5790"/>
+                </a:solidFill>
+              </a:rPr>
+              <a:t>(30));</a:t>
+            </a:r>
+          </a:p>
+        </p:txBody>
+      </p:sp>
+    </p:spTree>
+    <p:extLst>
+      <p:ext uri="{BB962C8B-B14F-4D97-AF65-F5344CB8AC3E}">
+        <p14:creationId xmlns:p14="http://schemas.microsoft.com/office/powerpoint/2010/main" val="2036629232"/>
+      </p:ext>
+    </p:extLst>
+  </p:cSld>
+  <p:clrMapOvr>
+    <a:masterClrMapping/>
+  </p:clrMapOvr>
+</p:sld>
+</file>
+
+<file path=ppt/slides/slide27.xml><?xml version="1.0" encoding="utf-8"?>
+<p:sld xmlns:a="http://schemas.openxmlformats.org/drawingml/2006/main" xmlns:r="http://schemas.openxmlformats.org/officeDocument/2006/relationships" xmlns:p="http://schemas.openxmlformats.org/presentationml/2006/main">
+  <p:cSld>
+    <p:bg>
+      <p:bgPr>
+        <a:blipFill dpi="0" rotWithShape="0">
+          <a:blip r:embed="rId2" cstate="print"/>
+          <a:srcRect/>
+          <a:stretch>
+            <a:fillRect/>
+          </a:stretch>
+        </a:blipFill>
+        <a:effectLst/>
+      </p:bgPr>
+    </p:bg>
+    <p:spTree>
+      <p:nvGrpSpPr>
+        <p:cNvPr id="1" name=""/>
+        <p:cNvGrpSpPr/>
+        <p:nvPr/>
+      </p:nvGrpSpPr>
+      <p:grpSpPr>
+        <a:xfrm>
+          <a:off x="0" y="0"/>
+          <a:ext cx="0" cy="0"/>
+          <a:chOff x="0" y="0"/>
+          <a:chExt cx="0" cy="0"/>
+        </a:xfrm>
+      </p:grpSpPr>
+      <p:sp>
+        <p:nvSpPr>
+          <p:cNvPr id="4098" name="Titre 3"/>
+          <p:cNvSpPr>
+            <a:spLocks noGrp="1"/>
+          </p:cNvSpPr>
+          <p:nvPr>
+            <p:ph type="title"/>
+          </p:nvPr>
+        </p:nvSpPr>
+        <p:spPr>
+          <a:xfrm>
+            <a:off x="228600" y="274638"/>
+            <a:ext cx="8686800" cy="1143000"/>
+          </a:xfrm>
+        </p:spPr>
+        <p:txBody>
+          <a:bodyPr/>
+          <a:lstStyle/>
+          <a:p>
+            <a:pPr lvl="1"/>
+            <a:r>
+              <a:rPr lang="en-US" sz="3200" dirty="0">
+                <a:solidFill>
+                  <a:schemeClr val="bg1"/>
+                </a:solidFill>
+              </a:rPr>
+              <a:t>Rule API (cont.)</a:t>
+            </a:r>
+            <a:endParaRPr lang="fr-CA" sz="3000" dirty="0">
+              <a:solidFill>
+                <a:schemeClr val="bg1"/>
+              </a:solidFill>
+            </a:endParaRPr>
+          </a:p>
+        </p:txBody>
+      </p:sp>
+      <p:sp>
+        <p:nvSpPr>
+          <p:cNvPr id="4099" name="Espace réservé du contenu 4"/>
+          <p:cNvSpPr>
+            <a:spLocks noGrp="1"/>
+          </p:cNvSpPr>
+          <p:nvPr>
+            <p:ph idx="1"/>
+          </p:nvPr>
+        </p:nvSpPr>
+        <p:spPr>
+          <a:xfrm>
+            <a:off x="76200" y="1981200"/>
+            <a:ext cx="8001000" cy="838200"/>
+          </a:xfrm>
+        </p:spPr>
+        <p:txBody>
+          <a:bodyPr/>
+          <a:lstStyle/>
+          <a:p>
+            <a:r>
+              <a:rPr lang="en-US" sz="1400" b="1" dirty="0">
+                <a:solidFill>
+                  <a:srgbClr val="3C5790"/>
+                </a:solidFill>
+              </a:rPr>
+              <a:t>The </a:t>
+            </a:r>
+            <a:r>
+              <a:rPr lang="en-US" sz="1400" b="1" dirty="0" err="1">
+                <a:solidFill>
+                  <a:srgbClr val="3C5790"/>
+                </a:solidFill>
+              </a:rPr>
+              <a:t>ExternalResource</a:t>
+            </a:r>
+            <a:r>
+              <a:rPr lang="en-US" sz="1400" b="1" dirty="0">
+                <a:solidFill>
+                  <a:srgbClr val="3C5790"/>
+                </a:solidFill>
+              </a:rPr>
+              <a:t> Rule</a:t>
+            </a:r>
+          </a:p>
+          <a:p>
+            <a:r>
+              <a:rPr lang="en-US" sz="1400" dirty="0">
+                <a:solidFill>
+                  <a:srgbClr val="3C5790"/>
+                </a:solidFill>
+              </a:rPr>
+              <a:t>We can extend the abstract class </a:t>
+            </a:r>
+            <a:r>
+              <a:rPr lang="en-US" sz="1400" dirty="0" err="1">
+                <a:solidFill>
+                  <a:srgbClr val="3C5790"/>
+                </a:solidFill>
+              </a:rPr>
+              <a:t>ExternalResource</a:t>
+            </a:r>
+            <a:r>
+              <a:rPr lang="en-US" sz="1400" dirty="0">
+                <a:solidFill>
+                  <a:srgbClr val="3C5790"/>
+                </a:solidFill>
+              </a:rPr>
+              <a:t> to set up an external resource before a test, such as a file or database connection.</a:t>
+            </a:r>
+          </a:p>
+        </p:txBody>
+      </p:sp>
+      <p:pic>
+        <p:nvPicPr>
+          <p:cNvPr id="2" name="Picture 1">
+            <a:extLst>
+              <a:ext uri="{FF2B5EF4-FFF2-40B4-BE49-F238E27FC236}">
+                <a16:creationId xmlns:a16="http://schemas.microsoft.com/office/drawing/2014/main" id="{D11F4971-DC06-46E4-B57A-121DB20E067A}"/>
+              </a:ext>
+            </a:extLst>
+          </p:cNvPr>
+          <p:cNvPicPr>
+            <a:picLocks noChangeAspect="1"/>
+          </p:cNvPicPr>
+          <p:nvPr/>
+        </p:nvPicPr>
+        <p:blipFill>
+          <a:blip r:embed="rId3"/>
+          <a:stretch>
+            <a:fillRect/>
+          </a:stretch>
+        </p:blipFill>
+        <p:spPr>
+          <a:xfrm>
+            <a:off x="1057046" y="3124200"/>
+            <a:ext cx="5877154" cy="2241020"/>
+          </a:xfrm>
+          <a:prstGeom prst="rect">
+            <a:avLst/>
+          </a:prstGeom>
+        </p:spPr>
+      </p:pic>
+    </p:spTree>
+    <p:extLst>
+      <p:ext uri="{BB962C8B-B14F-4D97-AF65-F5344CB8AC3E}">
+        <p14:creationId xmlns:p14="http://schemas.microsoft.com/office/powerpoint/2010/main" val="2112798825"/>
+      </p:ext>
+    </p:extLst>
+  </p:cSld>
+  <p:clrMapOvr>
+    <a:masterClrMapping/>
+  </p:clrMapOvr>
+</p:sld>
+</file>
+
+<file path=ppt/slides/slide28.xml><?xml version="1.0" encoding="utf-8"?>
+<p:sld xmlns:a="http://schemas.openxmlformats.org/drawingml/2006/main" xmlns:r="http://schemas.openxmlformats.org/officeDocument/2006/relationships" xmlns:p="http://schemas.openxmlformats.org/presentationml/2006/main">
+  <p:cSld>
+    <p:bg>
+      <p:bgPr>
+        <a:blipFill dpi="0" rotWithShape="0">
+          <a:blip r:embed="rId2" cstate="print"/>
+          <a:srcRect/>
+          <a:stretch>
+            <a:fillRect/>
+          </a:stretch>
+        </a:blipFill>
+        <a:effectLst/>
+      </p:bgPr>
+    </p:bg>
+    <p:spTree>
+      <p:nvGrpSpPr>
+        <p:cNvPr id="1" name=""/>
+        <p:cNvGrpSpPr/>
+        <p:nvPr/>
+      </p:nvGrpSpPr>
+      <p:grpSpPr>
+        <a:xfrm>
+          <a:off x="0" y="0"/>
+          <a:ext cx="0" cy="0"/>
+          <a:chOff x="0" y="0"/>
+          <a:chExt cx="0" cy="0"/>
+        </a:xfrm>
+      </p:grpSpPr>
+      <p:sp>
+        <p:nvSpPr>
+          <p:cNvPr id="4098" name="Titre 3"/>
+          <p:cNvSpPr>
+            <a:spLocks noGrp="1"/>
+          </p:cNvSpPr>
+          <p:nvPr>
+            <p:ph type="title"/>
+          </p:nvPr>
+        </p:nvSpPr>
+        <p:spPr>
+          <a:xfrm>
+            <a:off x="228600" y="274638"/>
+            <a:ext cx="8686800" cy="1143000"/>
+          </a:xfrm>
+        </p:spPr>
+        <p:txBody>
+          <a:bodyPr/>
+          <a:lstStyle/>
+          <a:p>
+            <a:pPr lvl="1"/>
+            <a:r>
+              <a:rPr lang="en-US" sz="3200" dirty="0">
+                <a:solidFill>
+                  <a:schemeClr val="bg1"/>
+                </a:solidFill>
+              </a:rPr>
+              <a:t>Rule API (cont.)</a:t>
+            </a:r>
+            <a:endParaRPr lang="fr-CA" sz="3000" dirty="0">
+              <a:solidFill>
+                <a:schemeClr val="bg1"/>
+              </a:solidFill>
+            </a:endParaRPr>
+          </a:p>
+        </p:txBody>
+      </p:sp>
+      <p:sp>
+        <p:nvSpPr>
+          <p:cNvPr id="4099" name="Espace réservé du contenu 4"/>
+          <p:cNvSpPr>
+            <a:spLocks noGrp="1"/>
+          </p:cNvSpPr>
+          <p:nvPr>
+            <p:ph idx="1"/>
+          </p:nvPr>
+        </p:nvSpPr>
+        <p:spPr>
+          <a:xfrm>
+            <a:off x="76200" y="1981200"/>
+            <a:ext cx="8001000" cy="1447800"/>
+          </a:xfrm>
+        </p:spPr>
+        <p:txBody>
+          <a:bodyPr/>
+          <a:lstStyle/>
+          <a:p>
+            <a:r>
+              <a:rPr lang="en-US" sz="1400" dirty="0">
+                <a:solidFill>
+                  <a:srgbClr val="3C5790"/>
+                </a:solidFill>
+              </a:rPr>
+              <a:t>Sometimes we need to apply a rule at the test class level, and we need to use the </a:t>
+            </a:r>
+            <a:r>
+              <a:rPr lang="en-US" sz="1400" b="1" dirty="0">
+                <a:solidFill>
+                  <a:srgbClr val="3C5790"/>
+                </a:solidFill>
+              </a:rPr>
+              <a:t>@</a:t>
+            </a:r>
+            <a:r>
+              <a:rPr lang="en-US" sz="1400" b="1" dirty="0" err="1">
+                <a:solidFill>
+                  <a:srgbClr val="3C5790"/>
+                </a:solidFill>
+              </a:rPr>
+              <a:t>ClassRule</a:t>
+            </a:r>
+            <a:r>
+              <a:rPr lang="en-US" sz="1400" dirty="0">
+                <a:solidFill>
+                  <a:srgbClr val="3C5790"/>
+                </a:solidFill>
+              </a:rPr>
+              <a:t> annotation. This annotation is like @Rule but wraps a rule around the whole test so the class rule needs to be a static field.</a:t>
+            </a:r>
+          </a:p>
+          <a:p>
+            <a:r>
+              <a:rPr lang="en-US" sz="1400" dirty="0">
+                <a:solidFill>
+                  <a:srgbClr val="3C5790"/>
+                </a:solidFill>
+              </a:rPr>
+              <a:t>We can write our custom rule by implementing the </a:t>
+            </a:r>
+            <a:r>
+              <a:rPr lang="en-US" sz="1400" b="1" dirty="0" err="1">
+                <a:solidFill>
+                  <a:srgbClr val="3C5790"/>
+                </a:solidFill>
+              </a:rPr>
+              <a:t>TestRule</a:t>
+            </a:r>
+            <a:r>
+              <a:rPr lang="en-US" sz="1400" dirty="0">
+                <a:solidFill>
+                  <a:srgbClr val="3C5790"/>
+                </a:solidFill>
+              </a:rPr>
+              <a:t> interface.</a:t>
+            </a:r>
+          </a:p>
+          <a:p>
+            <a:r>
+              <a:rPr lang="en-US" sz="1400" dirty="0">
+                <a:solidFill>
+                  <a:srgbClr val="3C5790"/>
+                </a:solidFill>
+              </a:rPr>
+              <a:t>We can use chain rules by using </a:t>
+            </a:r>
+            <a:r>
+              <a:rPr lang="en-US" sz="1400" b="1" dirty="0" err="1">
+                <a:solidFill>
+                  <a:srgbClr val="3C5790"/>
+                </a:solidFill>
+              </a:rPr>
+              <a:t>RuleChain</a:t>
+            </a:r>
+            <a:r>
+              <a:rPr lang="en-US" sz="1400" dirty="0">
+                <a:solidFill>
+                  <a:srgbClr val="3C5790"/>
+                </a:solidFill>
+              </a:rPr>
+              <a:t> custom rule that contains a list of rules.</a:t>
+            </a:r>
+          </a:p>
+        </p:txBody>
+      </p:sp>
+    </p:spTree>
+    <p:extLst>
+      <p:ext uri="{BB962C8B-B14F-4D97-AF65-F5344CB8AC3E}">
+        <p14:creationId xmlns:p14="http://schemas.microsoft.com/office/powerpoint/2010/main" val="2579863094"/>
+      </p:ext>
+    </p:extLst>
+  </p:cSld>
+  <p:clrMapOvr>
+    <a:masterClrMapping/>
+  </p:clrMapOvr>
+</p:sld>
+</file>
+
+<file path=ppt/slides/slide29.xml><?xml version="1.0" encoding="utf-8"?>
+<p:sld xmlns:a="http://schemas.openxmlformats.org/drawingml/2006/main" xmlns:r="http://schemas.openxmlformats.org/officeDocument/2006/relationships" xmlns:p="http://schemas.openxmlformats.org/presentationml/2006/main">
+  <p:cSld>
+    <p:bg>
+      <p:bgPr>
+        <a:blipFill dpi="0" rotWithShape="0">
+          <a:blip r:embed="rId2" cstate="print"/>
+          <a:srcRect/>
+          <a:stretch>
+            <a:fillRect/>
+          </a:stretch>
+        </a:blipFill>
+        <a:effectLst/>
+      </p:bgPr>
+    </p:bg>
+    <p:spTree>
+      <p:nvGrpSpPr>
+        <p:cNvPr id="1" name=""/>
+        <p:cNvGrpSpPr/>
+        <p:nvPr/>
+      </p:nvGrpSpPr>
+      <p:grpSpPr>
+        <a:xfrm>
+          <a:off x="0" y="0"/>
+          <a:ext cx="0" cy="0"/>
+          <a:chOff x="0" y="0"/>
+          <a:chExt cx="0" cy="0"/>
+        </a:xfrm>
+      </p:grpSpPr>
+      <p:sp>
+        <p:nvSpPr>
+          <p:cNvPr id="4098" name="Titre 3"/>
+          <p:cNvSpPr>
+            <a:spLocks noGrp="1"/>
+          </p:cNvSpPr>
+          <p:nvPr>
+            <p:ph type="title"/>
+          </p:nvPr>
+        </p:nvSpPr>
+        <p:spPr>
+          <a:xfrm>
+            <a:off x="228600" y="274638"/>
+            <a:ext cx="8686800" cy="1143000"/>
+          </a:xfrm>
+        </p:spPr>
+        <p:txBody>
+          <a:bodyPr/>
+          <a:lstStyle/>
+          <a:p>
+            <a:pPr lvl="1"/>
+            <a:r>
+              <a:rPr lang="en-US" sz="3200" dirty="0">
+                <a:solidFill>
+                  <a:schemeClr val="bg1"/>
+                </a:solidFill>
+              </a:rPr>
+              <a:t>Rule API (cont.)</a:t>
+            </a:r>
+            <a:endParaRPr lang="fr-CA" sz="3000" dirty="0">
+              <a:solidFill>
+                <a:schemeClr val="bg1"/>
+              </a:solidFill>
+            </a:endParaRPr>
+          </a:p>
+        </p:txBody>
+      </p:sp>
+      <p:pic>
+        <p:nvPicPr>
+          <p:cNvPr id="2" name="Picture 1">
+            <a:extLst>
+              <a:ext uri="{FF2B5EF4-FFF2-40B4-BE49-F238E27FC236}">
+                <a16:creationId xmlns:a16="http://schemas.microsoft.com/office/drawing/2014/main" id="{63D19555-F9EC-4521-8C7B-4B38C3C8F1B7}"/>
+              </a:ext>
+            </a:extLst>
+          </p:cNvPr>
+          <p:cNvPicPr>
+            <a:picLocks noChangeAspect="1"/>
+          </p:cNvPicPr>
+          <p:nvPr/>
+        </p:nvPicPr>
+        <p:blipFill>
+          <a:blip r:embed="rId3"/>
+          <a:stretch>
+            <a:fillRect/>
+          </a:stretch>
+        </p:blipFill>
+        <p:spPr>
+          <a:xfrm>
+            <a:off x="959269" y="2057400"/>
+            <a:ext cx="5822531" cy="3814762"/>
+          </a:xfrm>
+          <a:prstGeom prst="rect">
+            <a:avLst/>
+          </a:prstGeom>
+        </p:spPr>
+      </p:pic>
+    </p:spTree>
+    <p:extLst>
+      <p:ext uri="{BB962C8B-B14F-4D97-AF65-F5344CB8AC3E}">
+        <p14:creationId xmlns:p14="http://schemas.microsoft.com/office/powerpoint/2010/main" val="3490605208"/>
+      </p:ext>
+    </p:extLst>
+  </p:cSld>
+  <p:clrMapOvr>
+    <a:masterClrMapping/>
+  </p:clrMapOvr>
+</p:sld>
+</file>
+
+<file path=ppt/slides/slide3.xml><?xml version="1.0" encoding="utf-8"?>
+<p:sld xmlns:a="http://schemas.openxmlformats.org/drawingml/2006/main" xmlns:r="http://schemas.openxmlformats.org/officeDocument/2006/relationships" xmlns:p="http://schemas.openxmlformats.org/presentationml/2006/main">
+  <p:cSld>
+    <p:bg>
+      <p:bgPr>
+        <a:blipFill dpi="0" rotWithShape="0">
+          <a:blip r:embed="rId2" cstate="print"/>
+          <a:srcRect/>
+          <a:stretch>
+            <a:fillRect/>
+          </a:stretch>
+        </a:blipFill>
+        <a:effectLst/>
+      </p:bgPr>
+    </p:bg>
+    <p:spTree>
+      <p:nvGrpSpPr>
+        <p:cNvPr id="1" name=""/>
+        <p:cNvGrpSpPr/>
+        <p:nvPr/>
+      </p:nvGrpSpPr>
+      <p:grpSpPr>
+        <a:xfrm>
+          <a:off x="0" y="0"/>
+          <a:ext cx="0" cy="0"/>
+          <a:chOff x="0" y="0"/>
+          <a:chExt cx="0" cy="0"/>
+        </a:xfrm>
+      </p:grpSpPr>
+      <p:sp>
+        <p:nvSpPr>
+          <p:cNvPr id="4098" name="Titre 3"/>
+          <p:cNvSpPr>
+            <a:spLocks noGrp="1"/>
+          </p:cNvSpPr>
+          <p:nvPr>
+            <p:ph type="title"/>
+          </p:nvPr>
+        </p:nvSpPr>
+        <p:spPr/>
+        <p:txBody>
+          <a:bodyPr/>
+          <a:lstStyle/>
+          <a:p>
+            <a:r>
+              <a:rPr lang="fr-CA" dirty="0" err="1">
+                <a:solidFill>
+                  <a:schemeClr val="bg1"/>
+                </a:solidFill>
+              </a:rPr>
+              <a:t>What</a:t>
+            </a:r>
+            <a:r>
+              <a:rPr lang="fr-CA" dirty="0">
+                <a:solidFill>
+                  <a:schemeClr val="bg1"/>
+                </a:solidFill>
+              </a:rPr>
+              <a:t> </a:t>
+            </a:r>
+            <a:r>
+              <a:rPr lang="fr-CA" dirty="0" err="1">
+                <a:solidFill>
+                  <a:schemeClr val="bg1"/>
+                </a:solidFill>
+              </a:rPr>
+              <a:t>is</a:t>
+            </a:r>
+            <a:r>
+              <a:rPr lang="fr-CA" dirty="0">
+                <a:solidFill>
+                  <a:schemeClr val="bg1"/>
+                </a:solidFill>
+              </a:rPr>
+              <a:t> JUnit ?</a:t>
+            </a:r>
+          </a:p>
+        </p:txBody>
+      </p:sp>
+      <p:sp>
+        <p:nvSpPr>
+          <p:cNvPr id="4099" name="Espace réservé du contenu 4"/>
+          <p:cNvSpPr>
+            <a:spLocks noGrp="1"/>
+          </p:cNvSpPr>
+          <p:nvPr>
+            <p:ph idx="1"/>
+          </p:nvPr>
+        </p:nvSpPr>
+        <p:spPr>
+          <a:xfrm>
+            <a:off x="228600" y="2133600"/>
+            <a:ext cx="8686800" cy="2514600"/>
+          </a:xfrm>
+        </p:spPr>
+        <p:txBody>
+          <a:bodyPr/>
+          <a:lstStyle/>
+          <a:p>
+            <a:r>
+              <a:rPr lang="en-US" sz="1500" dirty="0">
+                <a:solidFill>
+                  <a:srgbClr val="3C5790"/>
+                </a:solidFill>
+              </a:rPr>
+              <a:t>JUnit is a unit testing framework for Java.</a:t>
+            </a:r>
+          </a:p>
+          <a:p>
+            <a:r>
+              <a:rPr lang="en-US" sz="1500" dirty="0">
+                <a:solidFill>
+                  <a:srgbClr val="3C5790"/>
+                </a:solidFill>
+              </a:rPr>
+              <a:t>JUnit it's used for test-driven development.</a:t>
+            </a:r>
+          </a:p>
+          <a:p>
+            <a:r>
+              <a:rPr lang="en-US" sz="1500" dirty="0">
+                <a:solidFill>
+                  <a:srgbClr val="3C5790"/>
+                </a:solidFill>
+              </a:rPr>
+              <a:t>JUnit is open source and documented.</a:t>
+            </a:r>
+          </a:p>
+          <a:p>
+            <a:endParaRPr lang="en-US" sz="1500" dirty="0">
+              <a:solidFill>
+                <a:srgbClr val="3C5790"/>
+              </a:solidFill>
+            </a:endParaRPr>
+          </a:p>
+        </p:txBody>
+      </p:sp>
+    </p:spTree>
+  </p:cSld>
+  <p:clrMapOvr>
+    <a:masterClrMapping/>
+  </p:clrMapOvr>
+</p:sld>
+</file>
+
+<file path=ppt/slides/slide30.xml><?xml version="1.0" encoding="utf-8"?>
+<p:sld xmlns:a="http://schemas.openxmlformats.org/drawingml/2006/main" xmlns:r="http://schemas.openxmlformats.org/officeDocument/2006/relationships" xmlns:p="http://schemas.openxmlformats.org/presentationml/2006/main">
+  <p:cSld>
+    <p:bg>
+      <p:bgPr>
+        <a:blipFill dpi="0" rotWithShape="0">
+          <a:blip r:embed="rId2" cstate="print"/>
+          <a:srcRect/>
+          <a:stretch>
+            <a:fillRect/>
+          </a:stretch>
+        </a:blipFill>
+        <a:effectLst/>
+      </p:bgPr>
+    </p:bg>
+    <p:spTree>
+      <p:nvGrpSpPr>
+        <p:cNvPr id="1" name=""/>
+        <p:cNvGrpSpPr/>
+        <p:nvPr/>
+      </p:nvGrpSpPr>
+      <p:grpSpPr>
+        <a:xfrm>
+          <a:off x="0" y="0"/>
+          <a:ext cx="0" cy="0"/>
+          <a:chOff x="0" y="0"/>
+          <a:chExt cx="0" cy="0"/>
+        </a:xfrm>
+      </p:grpSpPr>
+      <p:sp>
+        <p:nvSpPr>
+          <p:cNvPr id="4098" name="Titre 3"/>
+          <p:cNvSpPr>
+            <a:spLocks noGrp="1"/>
+          </p:cNvSpPr>
+          <p:nvPr>
+            <p:ph type="title"/>
+          </p:nvPr>
+        </p:nvSpPr>
+        <p:spPr>
+          <a:xfrm>
+            <a:off x="228600" y="274638"/>
+            <a:ext cx="8686800" cy="1143000"/>
+          </a:xfrm>
+        </p:spPr>
+        <p:txBody>
+          <a:bodyPr/>
+          <a:lstStyle/>
+          <a:p>
+            <a:pPr lvl="1"/>
+            <a:r>
+              <a:rPr lang="en-US" sz="3200" dirty="0">
+                <a:solidFill>
+                  <a:schemeClr val="bg1"/>
+                </a:solidFill>
+              </a:rPr>
+              <a:t>Rule API (cont.)</a:t>
+            </a:r>
+            <a:endParaRPr lang="fr-CA" sz="3000" dirty="0">
+              <a:solidFill>
+                <a:schemeClr val="bg1"/>
+              </a:solidFill>
+            </a:endParaRPr>
+          </a:p>
+        </p:txBody>
+      </p:sp>
+      <p:pic>
+        <p:nvPicPr>
+          <p:cNvPr id="3" name="Picture 2">
+            <a:extLst>
+              <a:ext uri="{FF2B5EF4-FFF2-40B4-BE49-F238E27FC236}">
+                <a16:creationId xmlns:a16="http://schemas.microsoft.com/office/drawing/2014/main" id="{98BDA3C3-2DE9-49D0-BD3F-9E0BFF6C385A}"/>
+              </a:ext>
+            </a:extLst>
+          </p:cNvPr>
+          <p:cNvPicPr>
+            <a:picLocks noChangeAspect="1"/>
+          </p:cNvPicPr>
+          <p:nvPr/>
+        </p:nvPicPr>
+        <p:blipFill>
+          <a:blip r:embed="rId3"/>
+          <a:stretch>
+            <a:fillRect/>
+          </a:stretch>
+        </p:blipFill>
+        <p:spPr>
+          <a:xfrm>
+            <a:off x="609600" y="2244957"/>
+            <a:ext cx="7696200" cy="2174643"/>
+          </a:xfrm>
+          <a:prstGeom prst="rect">
+            <a:avLst/>
+          </a:prstGeom>
+        </p:spPr>
+      </p:pic>
+      <p:pic>
+        <p:nvPicPr>
+          <p:cNvPr id="4" name="Picture 3">
+            <a:extLst>
+              <a:ext uri="{FF2B5EF4-FFF2-40B4-BE49-F238E27FC236}">
+                <a16:creationId xmlns:a16="http://schemas.microsoft.com/office/drawing/2014/main" id="{E4F58F69-B07F-44AC-AC63-590E5D431CBE}"/>
+              </a:ext>
+            </a:extLst>
+          </p:cNvPr>
+          <p:cNvPicPr>
+            <a:picLocks noChangeAspect="1"/>
+          </p:cNvPicPr>
+          <p:nvPr/>
+        </p:nvPicPr>
+        <p:blipFill>
+          <a:blip r:embed="rId4"/>
+          <a:stretch>
+            <a:fillRect/>
+          </a:stretch>
+        </p:blipFill>
+        <p:spPr>
+          <a:xfrm>
+            <a:off x="2409825" y="4695481"/>
+            <a:ext cx="3990975" cy="1324319"/>
+          </a:xfrm>
+          <a:prstGeom prst="rect">
+            <a:avLst/>
+          </a:prstGeom>
+        </p:spPr>
+      </p:pic>
+    </p:spTree>
+    <p:extLst>
+      <p:ext uri="{BB962C8B-B14F-4D97-AF65-F5344CB8AC3E}">
+        <p14:creationId xmlns:p14="http://schemas.microsoft.com/office/powerpoint/2010/main" val="2790636442"/>
+      </p:ext>
+    </p:extLst>
+  </p:cSld>
+  <p:clrMapOvr>
+    <a:masterClrMapping/>
+  </p:clrMapOvr>
+</p:sld>
+</file>
+
+<file path=ppt/slides/slide31.xml><?xml version="1.0" encoding="utf-8"?>
+<p:sld xmlns:a="http://schemas.openxmlformats.org/drawingml/2006/main" xmlns:r="http://schemas.openxmlformats.org/officeDocument/2006/relationships" xmlns:p="http://schemas.openxmlformats.org/presentationml/2006/main">
+  <p:cSld>
+    <p:bg>
+      <p:bgPr>
+        <a:blipFill dpi="0" rotWithShape="0">
+          <a:blip r:embed="rId2" cstate="print"/>
+          <a:srcRect/>
+          <a:stretch>
+            <a:fillRect/>
+          </a:stretch>
+        </a:blipFill>
+        <a:effectLst/>
+      </p:bgPr>
+    </p:bg>
+    <p:spTree>
+      <p:nvGrpSpPr>
+        <p:cNvPr id="1" name=""/>
+        <p:cNvGrpSpPr/>
+        <p:nvPr/>
+      </p:nvGrpSpPr>
+      <p:grpSpPr>
+        <a:xfrm>
+          <a:off x="0" y="0"/>
+          <a:ext cx="0" cy="0"/>
+          <a:chOff x="0" y="0"/>
+          <a:chExt cx="0" cy="0"/>
+        </a:xfrm>
+      </p:grpSpPr>
+      <p:sp>
+        <p:nvSpPr>
+          <p:cNvPr id="4098" name="Titre 3"/>
+          <p:cNvSpPr>
+            <a:spLocks noGrp="1"/>
+          </p:cNvSpPr>
+          <p:nvPr>
+            <p:ph type="title"/>
+          </p:nvPr>
+        </p:nvSpPr>
+        <p:spPr>
+          <a:xfrm>
+            <a:off x="228600" y="274638"/>
+            <a:ext cx="8686800" cy="1143000"/>
+          </a:xfrm>
+        </p:spPr>
+        <p:txBody>
+          <a:bodyPr/>
+          <a:lstStyle/>
+          <a:p>
+            <a:pPr lvl="1"/>
+            <a:r>
+              <a:rPr lang="en-US" sz="3200" dirty="0" err="1">
+                <a:solidFill>
+                  <a:schemeClr val="bg1"/>
+                </a:solidFill>
+              </a:rPr>
+              <a:t>Hamcrest</a:t>
+            </a:r>
+            <a:r>
+              <a:rPr lang="en-US" sz="3200" dirty="0">
+                <a:solidFill>
+                  <a:schemeClr val="bg1"/>
+                </a:solidFill>
+              </a:rPr>
+              <a:t> Matchers</a:t>
+            </a:r>
+            <a:endParaRPr lang="fr-CA" sz="3000" dirty="0">
+              <a:solidFill>
+                <a:schemeClr val="bg1"/>
+              </a:solidFill>
+            </a:endParaRPr>
+          </a:p>
+        </p:txBody>
+      </p:sp>
+      <p:sp>
+        <p:nvSpPr>
+          <p:cNvPr id="4099" name="Espace réservé du contenu 4"/>
+          <p:cNvSpPr>
+            <a:spLocks noGrp="1"/>
+          </p:cNvSpPr>
+          <p:nvPr>
+            <p:ph idx="1"/>
+          </p:nvPr>
+        </p:nvSpPr>
+        <p:spPr>
+          <a:xfrm>
+            <a:off x="76200" y="1981200"/>
+            <a:ext cx="8001000" cy="838200"/>
+          </a:xfrm>
+        </p:spPr>
+        <p:txBody>
+          <a:bodyPr/>
+          <a:lstStyle/>
+          <a:p>
+            <a:r>
+              <a:rPr lang="en-US" sz="1400">
+                <a:solidFill>
+                  <a:srgbClr val="3C5790"/>
+                </a:solidFill>
+              </a:rPr>
+              <a:t>Hamcrest is a library that contains a lot of useful matchers objects: constraints, predicates.</a:t>
+            </a:r>
+          </a:p>
+          <a:p>
+            <a:r>
+              <a:rPr lang="en-US" sz="1400">
+                <a:solidFill>
+                  <a:srgbClr val="3C5790"/>
+                </a:solidFill>
+              </a:rPr>
+              <a:t>Hamcrest isn't a testing framework, it helps specifying simple matching rules.</a:t>
+            </a:r>
+            <a:endParaRPr lang="en-US" sz="1400" dirty="0">
+              <a:solidFill>
+                <a:srgbClr val="3C5790"/>
+              </a:solidFill>
+            </a:endParaRPr>
+          </a:p>
+        </p:txBody>
+      </p:sp>
+      <p:pic>
+        <p:nvPicPr>
+          <p:cNvPr id="2" name="Picture 1">
+            <a:extLst>
+              <a:ext uri="{FF2B5EF4-FFF2-40B4-BE49-F238E27FC236}">
+                <a16:creationId xmlns:a16="http://schemas.microsoft.com/office/drawing/2014/main" id="{F479C3A1-2CE3-4F74-BC27-1D8D756CF21C}"/>
+              </a:ext>
+            </a:extLst>
+          </p:cNvPr>
+          <p:cNvPicPr>
+            <a:picLocks noChangeAspect="1"/>
+          </p:cNvPicPr>
+          <p:nvPr/>
+        </p:nvPicPr>
+        <p:blipFill>
+          <a:blip r:embed="rId3"/>
+          <a:stretch>
+            <a:fillRect/>
+          </a:stretch>
+        </p:blipFill>
+        <p:spPr>
+          <a:xfrm>
+            <a:off x="1138238" y="3200400"/>
+            <a:ext cx="7396162" cy="2399424"/>
+          </a:xfrm>
+          <a:prstGeom prst="rect">
+            <a:avLst/>
+          </a:prstGeom>
+        </p:spPr>
+      </p:pic>
+    </p:spTree>
+    <p:extLst>
+      <p:ext uri="{BB962C8B-B14F-4D97-AF65-F5344CB8AC3E}">
+        <p14:creationId xmlns:p14="http://schemas.microsoft.com/office/powerpoint/2010/main" val="3074852657"/>
+      </p:ext>
+    </p:extLst>
+  </p:cSld>
+  <p:clrMapOvr>
+    <a:masterClrMapping/>
+  </p:clrMapOvr>
+</p:sld>
+</file>
+
+<file path=ppt/slides/slide32.xml><?xml version="1.0" encoding="utf-8"?>
 <p:sld xmlns:a="http://schemas.openxmlformats.org/drawingml/2006/main" xmlns:r="http://schemas.openxmlformats.org/officeDocument/2006/relationships" xmlns:p="http://schemas.openxmlformats.org/presentationml/2006/main">
   <p:cSld>
     <p:bg>
@@ -6427,7 +8709,7 @@
 </p:sld>
 </file>
 
-<file path=ppt/slides/slide21.xml><?xml version="1.0" encoding="utf-8"?>
+<file path=ppt/slides/slide33.xml><?xml version="1.0" encoding="utf-8"?>
 <p:sld xmlns:a="http://schemas.openxmlformats.org/drawingml/2006/main" xmlns:r="http://schemas.openxmlformats.org/officeDocument/2006/relationships" xmlns:p="http://schemas.openxmlformats.org/presentationml/2006/main">
   <p:cSld>
     <p:bg>
@@ -7037,7 +9319,7 @@
 </p:sld>
 </file>
 
-<file path=ppt/slides/slide22.xml><?xml version="1.0" encoding="utf-8"?>
+<file path=ppt/slides/slide34.xml><?xml version="1.0" encoding="utf-8"?>
 <p:sld xmlns:a="http://schemas.openxmlformats.org/drawingml/2006/main" xmlns:r="http://schemas.openxmlformats.org/officeDocument/2006/relationships" xmlns:p="http://schemas.openxmlformats.org/presentationml/2006/main">
   <p:cSld>
     <p:bg>
@@ -7778,7 +10060,7 @@
 </p:sld>
 </file>
 
-<file path=ppt/slides/slide23.xml><?xml version="1.0" encoding="utf-8"?>
+<file path=ppt/slides/slide35.xml><?xml version="1.0" encoding="utf-8"?>
 <p:sld xmlns:a="http://schemas.openxmlformats.org/drawingml/2006/main" xmlns:r="http://schemas.openxmlformats.org/officeDocument/2006/relationships" xmlns:p="http://schemas.openxmlformats.org/presentationml/2006/main">
   <p:cSld>
     <p:bg>
@@ -7978,7 +10260,7 @@
 </p:sld>
 </file>
 
-<file path=ppt/slides/slide24.xml><?xml version="1.0" encoding="utf-8"?>
+<file path=ppt/slides/slide36.xml><?xml version="1.0" encoding="utf-8"?>
 <p:sld xmlns:a="http://schemas.openxmlformats.org/drawingml/2006/main" xmlns:r="http://schemas.openxmlformats.org/officeDocument/2006/relationships" xmlns:p="http://schemas.openxmlformats.org/presentationml/2006/main">
   <p:cSld>
     <p:bg>
@@ -8192,7 +10474,7 @@
 </p:sld>
 </file>
 
-<file path=ppt/slides/slide25.xml><?xml version="1.0" encoding="utf-8"?>
+<file path=ppt/slides/slide37.xml><?xml version="1.0" encoding="utf-8"?>
 <p:sld xmlns:a="http://schemas.openxmlformats.org/drawingml/2006/main" xmlns:r="http://schemas.openxmlformats.org/officeDocument/2006/relationships" xmlns:p="http://schemas.openxmlformats.org/presentationml/2006/main">
   <p:cSld>
     <p:bg>
@@ -8496,7 +10778,7 @@
 </p:sld>
 </file>
 
-<file path=ppt/slides/slide26.xml><?xml version="1.0" encoding="utf-8"?>
+<file path=ppt/slides/slide38.xml><?xml version="1.0" encoding="utf-8"?>
 <p:sld xmlns:a="http://schemas.openxmlformats.org/drawingml/2006/main" xmlns:r="http://schemas.openxmlformats.org/officeDocument/2006/relationships" xmlns:p="http://schemas.openxmlformats.org/presentationml/2006/main">
   <p:cSld>
     <p:bg>
@@ -8646,7 +10928,7 @@
 </p:sld>
 </file>
 
-<file path=ppt/slides/slide27.xml><?xml version="1.0" encoding="utf-8"?>
+<file path=ppt/slides/slide39.xml><?xml version="1.0" encoding="utf-8"?>
 <p:sld xmlns:a="http://schemas.openxmlformats.org/drawingml/2006/main" xmlns:r="http://schemas.openxmlformats.org/officeDocument/2006/relationships" xmlns:p="http://schemas.openxmlformats.org/presentationml/2006/main">
   <p:cSld>
     <p:bg>
@@ -8786,7 +11068,225 @@
 </p:sld>
 </file>
 
-<file path=ppt/slides/slide28.xml><?xml version="1.0" encoding="utf-8"?>
+<file path=ppt/slides/slide4.xml><?xml version="1.0" encoding="utf-8"?>
+<p:sld xmlns:a="http://schemas.openxmlformats.org/drawingml/2006/main" xmlns:r="http://schemas.openxmlformats.org/officeDocument/2006/relationships" xmlns:p="http://schemas.openxmlformats.org/presentationml/2006/main">
+  <p:cSld>
+    <p:bg>
+      <p:bgPr>
+        <a:blipFill dpi="0" rotWithShape="0">
+          <a:blip r:embed="rId2" cstate="print"/>
+          <a:srcRect/>
+          <a:stretch>
+            <a:fillRect/>
+          </a:stretch>
+        </a:blipFill>
+        <a:effectLst/>
+      </p:bgPr>
+    </p:bg>
+    <p:spTree>
+      <p:nvGrpSpPr>
+        <p:cNvPr id="1" name=""/>
+        <p:cNvGrpSpPr/>
+        <p:nvPr/>
+      </p:nvGrpSpPr>
+      <p:grpSpPr>
+        <a:xfrm>
+          <a:off x="0" y="0"/>
+          <a:ext cx="0" cy="0"/>
+          <a:chOff x="0" y="0"/>
+          <a:chExt cx="0" cy="0"/>
+        </a:xfrm>
+      </p:grpSpPr>
+      <p:sp>
+        <p:nvSpPr>
+          <p:cNvPr id="4098" name="Titre 3"/>
+          <p:cNvSpPr>
+            <a:spLocks noGrp="1"/>
+          </p:cNvSpPr>
+          <p:nvPr>
+            <p:ph type="title"/>
+          </p:nvPr>
+        </p:nvSpPr>
+        <p:spPr/>
+        <p:txBody>
+          <a:bodyPr/>
+          <a:lstStyle/>
+          <a:p>
+            <a:r>
+              <a:rPr lang="fr-CA" dirty="0" err="1">
+                <a:solidFill>
+                  <a:schemeClr val="bg1"/>
+                </a:solidFill>
+              </a:rPr>
+              <a:t>Features</a:t>
+            </a:r>
+            <a:endParaRPr lang="fr-CA" dirty="0">
+              <a:solidFill>
+                <a:schemeClr val="bg1"/>
+              </a:solidFill>
+            </a:endParaRPr>
+          </a:p>
+        </p:txBody>
+      </p:sp>
+      <p:sp>
+        <p:nvSpPr>
+          <p:cNvPr id="4099" name="Espace réservé du contenu 4"/>
+          <p:cNvSpPr>
+            <a:spLocks noGrp="1"/>
+          </p:cNvSpPr>
+          <p:nvPr>
+            <p:ph idx="1"/>
+          </p:nvPr>
+        </p:nvSpPr>
+        <p:spPr>
+          <a:xfrm>
+            <a:off x="304800" y="1905000"/>
+            <a:ext cx="8534400" cy="3962400"/>
+          </a:xfrm>
+        </p:spPr>
+        <p:txBody>
+          <a:bodyPr/>
+          <a:lstStyle/>
+          <a:p>
+            <a:r>
+              <a:rPr lang="en-US" sz="1400" dirty="0">
+                <a:solidFill>
+                  <a:srgbClr val="3C5790"/>
+                </a:solidFill>
+              </a:rPr>
+              <a:t>Separate test class instances and class loaders for each unit test to avoid side effects.</a:t>
+            </a:r>
+          </a:p>
+          <a:p>
+            <a:r>
+              <a:rPr lang="en-US" sz="1400" dirty="0">
+                <a:solidFill>
+                  <a:srgbClr val="3C5790"/>
+                </a:solidFill>
+              </a:rPr>
+              <a:t>JUnit annotations to provide resource initialization and call methods: @Before, @</a:t>
+            </a:r>
+            <a:r>
+              <a:rPr lang="en-US" sz="1400" dirty="0" err="1">
+                <a:solidFill>
+                  <a:srgbClr val="3C5790"/>
+                </a:solidFill>
+              </a:rPr>
+              <a:t>BeforeClass</a:t>
+            </a:r>
+            <a:r>
+              <a:rPr lang="en-US" sz="1400" dirty="0">
+                <a:solidFill>
+                  <a:srgbClr val="3C5790"/>
+                </a:solidFill>
+              </a:rPr>
+              <a:t>, @After, @</a:t>
+            </a:r>
+            <a:r>
+              <a:rPr lang="en-US" sz="1400" dirty="0" err="1">
+                <a:solidFill>
+                  <a:srgbClr val="3C5790"/>
+                </a:solidFill>
+              </a:rPr>
+              <a:t>AfterClass</a:t>
+            </a:r>
+            <a:r>
+              <a:rPr lang="en-US" sz="1400" dirty="0">
+                <a:solidFill>
+                  <a:srgbClr val="3C5790"/>
+                </a:solidFill>
+              </a:rPr>
+              <a:t>.</a:t>
+            </a:r>
+          </a:p>
+          <a:p>
+            <a:r>
+              <a:rPr lang="en-US" sz="1400" dirty="0">
+                <a:solidFill>
+                  <a:srgbClr val="3C5790"/>
+                </a:solidFill>
+              </a:rPr>
+              <a:t>A variety of assert methods to make it easy to check the results of the tests.</a:t>
+            </a:r>
+          </a:p>
+          <a:p>
+            <a:r>
+              <a:rPr lang="en-US" sz="1400" dirty="0">
+                <a:solidFill>
+                  <a:srgbClr val="3C5790"/>
+                </a:solidFill>
+              </a:rPr>
+              <a:t>Provides test runners for running tests.</a:t>
+            </a:r>
+          </a:p>
+          <a:p>
+            <a:r>
+              <a:rPr lang="en-US" sz="1400" dirty="0">
+                <a:solidFill>
+                  <a:srgbClr val="3C5790"/>
+                </a:solidFill>
+              </a:rPr>
+              <a:t>Integration with tools like And, Maven.</a:t>
+            </a:r>
+          </a:p>
+          <a:p>
+            <a:r>
+              <a:rPr lang="en-US" sz="1400" dirty="0">
+                <a:solidFill>
+                  <a:srgbClr val="3C5790"/>
+                </a:solidFill>
+              </a:rPr>
+              <a:t>Integration with IDEs like Eclipse, NetBeans, </a:t>
+            </a:r>
+            <a:r>
+              <a:rPr lang="en-US" sz="1400" dirty="0" err="1">
+                <a:solidFill>
+                  <a:srgbClr val="3C5790"/>
+                </a:solidFill>
+              </a:rPr>
+              <a:t>ItelliJ</a:t>
+            </a:r>
+            <a:r>
+              <a:rPr lang="en-US" sz="1400" dirty="0">
+                <a:solidFill>
+                  <a:srgbClr val="3C5790"/>
+                </a:solidFill>
+              </a:rPr>
+              <a:t>, </a:t>
+            </a:r>
+            <a:r>
+              <a:rPr lang="en-US" sz="1400" dirty="0" err="1">
+                <a:solidFill>
+                  <a:srgbClr val="3C5790"/>
+                </a:solidFill>
+              </a:rPr>
+              <a:t>Jbuilder</a:t>
+            </a:r>
+            <a:r>
+              <a:rPr lang="en-US" sz="1400" dirty="0">
+                <a:solidFill>
+                  <a:srgbClr val="3C5790"/>
+                </a:solidFill>
+              </a:rPr>
+              <a:t>.</a:t>
+            </a:r>
+            <a:endParaRPr lang="en-US" sz="1200" dirty="0">
+              <a:solidFill>
+                <a:srgbClr val="3C5790"/>
+              </a:solidFill>
+            </a:endParaRPr>
+          </a:p>
+        </p:txBody>
+      </p:sp>
+    </p:spTree>
+  </p:cSld>
+  <p:clrMapOvr>
+    <a:masterClrMapping/>
+  </p:clrMapOvr>
+</p:sld>
+</file>
+
+<file path=ppt/slides/slide40.xml><?xml version="1.0" encoding="utf-8"?>
 <p:sld xmlns:a="http://schemas.openxmlformats.org/drawingml/2006/main" xmlns:r="http://schemas.openxmlformats.org/officeDocument/2006/relationships" xmlns:p="http://schemas.openxmlformats.org/presentationml/2006/main">
   <p:cSld>
     <p:bg>
@@ -8978,7 +11478,7 @@
 </p:sld>
 </file>
 
-<file path=ppt/slides/slide29.xml><?xml version="1.0" encoding="utf-8"?>
+<file path=ppt/slides/slide41.xml><?xml version="1.0" encoding="utf-8"?>
 <p:sld xmlns:a="http://schemas.openxmlformats.org/drawingml/2006/main" xmlns:r="http://schemas.openxmlformats.org/officeDocument/2006/relationships" xmlns:p="http://schemas.openxmlformats.org/presentationml/2006/main">
   <p:cSld>
     <p:bg>
@@ -9191,7 +11691,7 @@
 </p:sld>
 </file>
 
-<file path=ppt/slides/slide3.xml><?xml version="1.0" encoding="utf-8"?>
+<file path=ppt/slides/slide42.xml><?xml version="1.0" encoding="utf-8"?>
 <p:sld xmlns:a="http://schemas.openxmlformats.org/drawingml/2006/main" xmlns:r="http://schemas.openxmlformats.org/officeDocument/2006/relationships" xmlns:p="http://schemas.openxmlformats.org/presentationml/2006/main">
   <p:cSld>
     <p:bg>
@@ -9230,43 +11730,30 @@
             <p:ph type="title"/>
           </p:nvPr>
         </p:nvSpPr>
-        <p:spPr/>
+        <p:spPr>
+          <a:xfrm>
+            <a:off x="228600" y="274638"/>
+            <a:ext cx="8686800" cy="1143000"/>
+          </a:xfrm>
+        </p:spPr>
         <p:txBody>
           <a:bodyPr/>
           <a:lstStyle/>
           <a:p>
-            <a:r>
-              <a:rPr lang="fr-CA" dirty="0" err="1">
+            <a:pPr lvl="1"/>
+            <a:r>
+              <a:rPr lang="en-US" sz="3200" dirty="0">
                 <a:solidFill>
                   <a:schemeClr val="bg1"/>
                 </a:solidFill>
               </a:rPr>
-              <a:t>What</a:t>
-            </a:r>
-            <a:r>
-              <a:rPr lang="fr-CA" dirty="0">
-                <a:solidFill>
-                  <a:schemeClr val="bg1"/>
-                </a:solidFill>
-              </a:rPr>
-              <a:t> </a:t>
-            </a:r>
-            <a:r>
-              <a:rPr lang="fr-CA" dirty="0" err="1">
-                <a:solidFill>
-                  <a:schemeClr val="bg1"/>
-                </a:solidFill>
-              </a:rPr>
-              <a:t>is</a:t>
-            </a:r>
-            <a:r>
-              <a:rPr lang="fr-CA" dirty="0">
-                <a:solidFill>
-                  <a:schemeClr val="bg1"/>
-                </a:solidFill>
-              </a:rPr>
-              <a:t> JUnit ?</a:t>
-            </a:r>
+              <a:t>Test Coverage (cont.)</a:t>
+            </a:r>
+            <a:endParaRPr lang="fr-CA" sz="3000" dirty="0">
+              <a:solidFill>
+                <a:schemeClr val="bg1"/>
+              </a:solidFill>
+            </a:endParaRPr>
           </a:p>
         </p:txBody>
       </p:sp>
@@ -9282,8 +11769,8 @@
         </p:nvSpPr>
         <p:spPr>
           <a:xfrm>
-            <a:off x="228600" y="2133600"/>
-            <a:ext cx="8686800" cy="2514600"/>
+            <a:off x="76200" y="1981200"/>
+            <a:ext cx="8686800" cy="4648200"/>
           </a:xfrm>
         </p:spPr>
         <p:txBody>
@@ -9291,36 +11778,205 @@
           <a:lstStyle/>
           <a:p>
             <a:r>
-              <a:rPr lang="en-US" sz="1500" dirty="0">
-                <a:solidFill>
-                  <a:srgbClr val="3C5790"/>
-                </a:solidFill>
-              </a:rPr>
-              <a:t>JUnit is a unit testing framework for Java.</a:t>
-            </a:r>
-          </a:p>
-          <a:p>
-            <a:r>
-              <a:rPr lang="en-US" sz="1500" dirty="0">
-                <a:solidFill>
-                  <a:srgbClr val="3C5790"/>
-                </a:solidFill>
-              </a:rPr>
-              <a:t>JUnit it's used for test-driven development.</a:t>
-            </a:r>
-          </a:p>
-          <a:p>
-            <a:r>
-              <a:rPr lang="en-US" sz="1500" dirty="0">
-                <a:solidFill>
-                  <a:srgbClr val="3C5790"/>
-                </a:solidFill>
-              </a:rPr>
-              <a:t>JUnit is open source and documented.</a:t>
-            </a:r>
-          </a:p>
-          <a:p>
-            <a:endParaRPr lang="en-US" sz="1500" dirty="0">
+              <a:rPr lang="en-US" sz="1400" dirty="0">
+                <a:solidFill>
+                  <a:srgbClr val="3C5790"/>
+                </a:solidFill>
+              </a:rPr>
+              <a:t>Other code coverage tools:</a:t>
+            </a:r>
+          </a:p>
+          <a:p>
+            <a:pPr lvl="1"/>
+            <a:r>
+              <a:rPr lang="en-US" sz="1400" b="1" dirty="0" err="1">
+                <a:solidFill>
+                  <a:srgbClr val="3C5790"/>
+                </a:solidFill>
+              </a:rPr>
+              <a:t>Jcov</a:t>
+            </a:r>
+            <a:r>
+              <a:rPr lang="en-US" sz="1400" dirty="0">
+                <a:solidFill>
+                  <a:srgbClr val="3C5790"/>
+                </a:solidFill>
+              </a:rPr>
+              <a:t>: well integrated with Oracle test infrastructure (</a:t>
+            </a:r>
+            <a:r>
+              <a:rPr lang="en-US" sz="1400" dirty="0" err="1">
+                <a:solidFill>
+                  <a:srgbClr val="3C5790"/>
+                </a:solidFill>
+              </a:rPr>
+              <a:t>JavaTest</a:t>
+            </a:r>
+            <a:r>
+              <a:rPr lang="en-US" sz="1400" dirty="0">
+                <a:solidFill>
+                  <a:srgbClr val="3C5790"/>
+                </a:solidFill>
+              </a:rPr>
+              <a:t>, </a:t>
+            </a:r>
+            <a:r>
+              <a:rPr lang="en-US" sz="1400" dirty="0" err="1">
+                <a:solidFill>
+                  <a:srgbClr val="3C5790"/>
+                </a:solidFill>
+              </a:rPr>
+              <a:t>JTReg</a:t>
+            </a:r>
+            <a:r>
+              <a:rPr lang="en-US" sz="1400" dirty="0">
+                <a:solidFill>
+                  <a:srgbClr val="3C5790"/>
+                </a:solidFill>
+              </a:rPr>
+              <a:t>)</a:t>
+            </a:r>
+          </a:p>
+          <a:p>
+            <a:pPr lvl="1"/>
+            <a:r>
+              <a:rPr lang="en-US" sz="1400" b="1" dirty="0" err="1">
+                <a:solidFill>
+                  <a:srgbClr val="3C5790"/>
+                </a:solidFill>
+              </a:rPr>
+              <a:t>Atlasian</a:t>
+            </a:r>
+            <a:r>
+              <a:rPr lang="en-US" sz="1400" b="1" dirty="0">
+                <a:solidFill>
+                  <a:srgbClr val="3C5790"/>
+                </a:solidFill>
+              </a:rPr>
+              <a:t> Clover</a:t>
+            </a:r>
+            <a:r>
+              <a:rPr lang="en-US" sz="1400" dirty="0">
+                <a:solidFill>
+                  <a:srgbClr val="3C5790"/>
+                </a:solidFill>
+              </a:rPr>
+              <a:t>: for Java and Groovy</a:t>
+            </a:r>
+          </a:p>
+          <a:p>
+            <a:pPr lvl="1"/>
+            <a:r>
+              <a:rPr lang="en-US" sz="1400" b="1" dirty="0">
+                <a:solidFill>
+                  <a:srgbClr val="3C5790"/>
+                </a:solidFill>
+              </a:rPr>
+              <a:t>Serenity</a:t>
+            </a:r>
+            <a:r>
+              <a:rPr lang="en-US" sz="1400" dirty="0">
+                <a:solidFill>
+                  <a:srgbClr val="3C5790"/>
+                </a:solidFill>
+              </a:rPr>
+              <a:t>: for acceptance testing</a:t>
+            </a:r>
+          </a:p>
+          <a:p>
+            <a:pPr lvl="1"/>
+            <a:r>
+              <a:rPr lang="en-US" sz="1400" b="1" dirty="0" err="1">
+                <a:solidFill>
+                  <a:srgbClr val="3C5790"/>
+                </a:solidFill>
+              </a:rPr>
+              <a:t>CodeCover</a:t>
+            </a:r>
+            <a:r>
+              <a:rPr lang="en-US" sz="1400" dirty="0">
+                <a:solidFill>
+                  <a:srgbClr val="3C5790"/>
+                </a:solidFill>
+              </a:rPr>
+              <a:t>: for Java and COBOL</a:t>
+            </a:r>
+          </a:p>
+          <a:p>
+            <a:pPr lvl="1"/>
+            <a:r>
+              <a:rPr lang="en-US" sz="1400" b="1" dirty="0">
+                <a:solidFill>
+                  <a:srgbClr val="3C5790"/>
+                </a:solidFill>
+              </a:rPr>
+              <a:t>EMMA</a:t>
+            </a:r>
+            <a:r>
+              <a:rPr lang="en-US" sz="1400" dirty="0">
+                <a:solidFill>
+                  <a:srgbClr val="3C5790"/>
+                </a:solidFill>
+              </a:rPr>
+              <a:t>: oldest most popular coverage tool</a:t>
+            </a:r>
+          </a:p>
+          <a:p>
+            <a:pPr lvl="1"/>
+            <a:r>
+              <a:rPr lang="en-US" sz="1400" b="1" dirty="0">
+                <a:solidFill>
+                  <a:srgbClr val="3C5790"/>
+                </a:solidFill>
+              </a:rPr>
+              <a:t>Gretel</a:t>
+            </a:r>
+            <a:r>
+              <a:rPr lang="en-US" sz="1400" dirty="0">
+                <a:solidFill>
+                  <a:srgbClr val="3C5790"/>
+                </a:solidFill>
+              </a:rPr>
+              <a:t>: used by the University of Oregon</a:t>
+            </a:r>
+          </a:p>
+          <a:p>
+            <a:pPr lvl="1"/>
+            <a:r>
+              <a:rPr lang="en-US" sz="1400" b="1" dirty="0" err="1">
+                <a:solidFill>
+                  <a:srgbClr val="3C5790"/>
+                </a:solidFill>
+              </a:rPr>
+              <a:t>Parasoft</a:t>
+            </a:r>
+            <a:r>
+              <a:rPr lang="en-US" sz="1400" b="1" dirty="0">
+                <a:solidFill>
+                  <a:srgbClr val="3C5790"/>
+                </a:solidFill>
+              </a:rPr>
+              <a:t> </a:t>
+            </a:r>
+            <a:r>
+              <a:rPr lang="en-US" sz="1400" b="1" dirty="0" err="1">
+                <a:solidFill>
+                  <a:srgbClr val="3C5790"/>
+                </a:solidFill>
+              </a:rPr>
+              <a:t>Jtest</a:t>
+            </a:r>
+            <a:r>
+              <a:rPr lang="en-US" sz="1400" dirty="0">
+                <a:solidFill>
+                  <a:srgbClr val="3C5790"/>
+                </a:solidFill>
+              </a:rPr>
+              <a:t>: has a large suite of purposes</a:t>
+            </a:r>
+          </a:p>
+          <a:p>
+            <a:endParaRPr lang="en-US" sz="1400" dirty="0">
               <a:solidFill>
                 <a:srgbClr val="3C5790"/>
               </a:solidFill>
@@ -9329,6 +11985,11 @@
         </p:txBody>
       </p:sp>
     </p:spTree>
+    <p:extLst>
+      <p:ext uri="{BB962C8B-B14F-4D97-AF65-F5344CB8AC3E}">
+        <p14:creationId xmlns:p14="http://schemas.microsoft.com/office/powerpoint/2010/main" val="2617873789"/>
+      </p:ext>
+    </p:extLst>
   </p:cSld>
   <p:clrMapOvr>
     <a:masterClrMapping/>
@@ -9336,7 +11997,7 @@
 </p:sld>
 </file>
 
-<file path=ppt/slides/slide30.xml><?xml version="1.0" encoding="utf-8"?>
+<file path=ppt/slides/slide43.xml><?xml version="1.0" encoding="utf-8"?>
 <p:sld xmlns:a="http://schemas.openxmlformats.org/drawingml/2006/main" xmlns:r="http://schemas.openxmlformats.org/officeDocument/2006/relationships" xmlns:p="http://schemas.openxmlformats.org/presentationml/2006/main">
   <p:cSld>
     <p:bg>
@@ -9392,7 +12053,7 @@
                   <a:schemeClr val="bg1"/>
                 </a:solidFill>
               </a:rPr>
-              <a:t>Test Coverage (cont.)</a:t>
+              <a:t>Mocks</a:t>
             </a:r>
             <a:endParaRPr lang="fr-CA" sz="3000" dirty="0">
               <a:solidFill>
@@ -9415,7 +12076,7 @@
         <p:spPr>
           <a:xfrm>
             <a:off x="76200" y="1981200"/>
-            <a:ext cx="8686800" cy="4648200"/>
+            <a:ext cx="8686800" cy="3200400"/>
           </a:xfrm>
         </p:spPr>
         <p:txBody>
@@ -9428,211 +12089,69 @@
                   <a:srgbClr val="3C5790"/>
                 </a:solidFill>
               </a:rPr>
-              <a:t>Other code coverage tools:</a:t>
-            </a:r>
-          </a:p>
-          <a:p>
-            <a:pPr lvl="1"/>
-            <a:r>
-              <a:rPr lang="en-US" sz="1400" b="1" dirty="0" err="1">
-                <a:solidFill>
-                  <a:srgbClr val="3C5790"/>
-                </a:solidFill>
-              </a:rPr>
-              <a:t>Jcov</a:t>
-            </a:r>
-            <a:r>
-              <a:rPr lang="en-US" sz="1400" dirty="0">
-                <a:solidFill>
-                  <a:srgbClr val="3C5790"/>
-                </a:solidFill>
-              </a:rPr>
-              <a:t>: well integrated with Oracle test infrastructure (</a:t>
-            </a:r>
-            <a:r>
-              <a:rPr lang="en-US" sz="1400" dirty="0" err="1">
-                <a:solidFill>
-                  <a:srgbClr val="3C5790"/>
-                </a:solidFill>
-              </a:rPr>
-              <a:t>JavaTest</a:t>
-            </a:r>
-            <a:r>
-              <a:rPr lang="en-US" sz="1400" dirty="0">
-                <a:solidFill>
-                  <a:srgbClr val="3C5790"/>
-                </a:solidFill>
-              </a:rPr>
-              <a:t>, </a:t>
-            </a:r>
-            <a:r>
-              <a:rPr lang="en-US" sz="1400" dirty="0" err="1">
-                <a:solidFill>
-                  <a:srgbClr val="3C5790"/>
-                </a:solidFill>
-              </a:rPr>
-              <a:t>JTReg</a:t>
-            </a:r>
-            <a:r>
-              <a:rPr lang="en-US" sz="1400" dirty="0">
-                <a:solidFill>
-                  <a:srgbClr val="3C5790"/>
-                </a:solidFill>
-              </a:rPr>
-              <a:t>)</a:t>
-            </a:r>
-          </a:p>
-          <a:p>
-            <a:pPr lvl="1"/>
-            <a:r>
-              <a:rPr lang="en-US" sz="1400" b="1" dirty="0" err="1">
-                <a:solidFill>
-                  <a:srgbClr val="3C5790"/>
-                </a:solidFill>
-              </a:rPr>
-              <a:t>Atlasian</a:t>
-            </a:r>
+              <a:t>Testing in isolation offers strong benefits.</a:t>
+            </a:r>
+          </a:p>
+          <a:p>
             <a:r>
               <a:rPr lang="en-US" sz="1400" b="1" dirty="0">
                 <a:solidFill>
                   <a:srgbClr val="3C5790"/>
                 </a:solidFill>
               </a:rPr>
-              <a:t> Clover</a:t>
-            </a:r>
-            <a:r>
-              <a:rPr lang="en-US" sz="1400" dirty="0">
-                <a:solidFill>
-                  <a:srgbClr val="3C5790"/>
-                </a:solidFill>
-              </a:rPr>
-              <a:t>: for Java and Groovy</a:t>
-            </a:r>
-          </a:p>
-          <a:p>
-            <a:pPr lvl="1"/>
+              <a:t>Mock</a:t>
+            </a:r>
+            <a:r>
+              <a:rPr lang="en-US" sz="1400" dirty="0">
+                <a:solidFill>
+                  <a:srgbClr val="3C5790"/>
+                </a:solidFill>
+              </a:rPr>
+              <a:t> objects (or mocks) are perfect for testing a portion of code logic in isolation from the rest of the code.</a:t>
+            </a:r>
+          </a:p>
+          <a:p>
+            <a:r>
+              <a:rPr lang="en-US" sz="1400" dirty="0">
+                <a:solidFill>
+                  <a:srgbClr val="3C5790"/>
+                </a:solidFill>
+              </a:rPr>
+              <a:t>Mocks don't implement any logic, they're empty shells that provide methods to let the test control the behavior of the business. </a:t>
+            </a:r>
+          </a:p>
+          <a:p>
+            <a:r>
+              <a:rPr lang="en-US" sz="1400" dirty="0">
+                <a:solidFill>
+                  <a:srgbClr val="3C5790"/>
+                </a:solidFill>
+              </a:rPr>
+              <a:t>Only </a:t>
+            </a:r>
             <a:r>
               <a:rPr lang="en-US" sz="1400" b="1" dirty="0">
                 <a:solidFill>
                   <a:srgbClr val="3C5790"/>
                 </a:solidFill>
               </a:rPr>
-              <a:t>Serenity</a:t>
-            </a:r>
-            <a:r>
-              <a:rPr lang="en-US" sz="1400" dirty="0">
-                <a:solidFill>
-                  <a:srgbClr val="3C5790"/>
-                </a:solidFill>
-              </a:rPr>
-              <a:t>: for acceptance testing</a:t>
-            </a:r>
-          </a:p>
-          <a:p>
-            <a:pPr lvl="1"/>
-            <a:r>
-              <a:rPr lang="en-US" sz="1400" b="1" dirty="0" err="1">
-                <a:solidFill>
-                  <a:srgbClr val="3C5790"/>
-                </a:solidFill>
-              </a:rPr>
-              <a:t>CodeCover</a:t>
-            </a:r>
-            <a:r>
-              <a:rPr lang="en-US" sz="1400" dirty="0">
-                <a:solidFill>
-                  <a:srgbClr val="3C5790"/>
-                </a:solidFill>
-              </a:rPr>
-              <a:t>: for Java and COBOL</a:t>
-            </a:r>
-          </a:p>
-          <a:p>
-            <a:pPr lvl="1"/>
-            <a:r>
-              <a:rPr lang="en-US" sz="1400" b="1" dirty="0">
-                <a:solidFill>
-                  <a:srgbClr val="3C5790"/>
-                </a:solidFill>
-              </a:rPr>
-              <a:t>EMMA</a:t>
-            </a:r>
-            <a:r>
-              <a:rPr lang="en-US" sz="1400" dirty="0">
-                <a:solidFill>
-                  <a:srgbClr val="3C5790"/>
-                </a:solidFill>
-              </a:rPr>
-              <a:t>: oldest most popular coverage tool</a:t>
-            </a:r>
-          </a:p>
-          <a:p>
-            <a:pPr lvl="1"/>
-            <a:r>
-              <a:rPr lang="en-US" sz="1400" b="1" dirty="0">
-                <a:solidFill>
-                  <a:srgbClr val="3C5790"/>
-                </a:solidFill>
-              </a:rPr>
-              <a:t>Gretel</a:t>
-            </a:r>
-            <a:r>
-              <a:rPr lang="en-US" sz="1400" dirty="0">
-                <a:solidFill>
-                  <a:srgbClr val="3C5790"/>
-                </a:solidFill>
-              </a:rPr>
-              <a:t>: used by the University of Oregon</a:t>
-            </a:r>
-          </a:p>
-          <a:p>
-            <a:pPr lvl="1"/>
-            <a:r>
-              <a:rPr lang="en-US" sz="1400" b="1" dirty="0" err="1">
-                <a:solidFill>
-                  <a:srgbClr val="3C5790"/>
-                </a:solidFill>
-              </a:rPr>
-              <a:t>Parasoft</a:t>
-            </a:r>
-            <a:r>
-              <a:rPr lang="en-US" sz="1400" b="1" dirty="0">
-                <a:solidFill>
-                  <a:srgbClr val="3C5790"/>
-                </a:solidFill>
-              </a:rPr>
-              <a:t> </a:t>
-            </a:r>
-            <a:r>
-              <a:rPr lang="en-US" sz="1400" b="1" dirty="0" err="1">
-                <a:solidFill>
-                  <a:srgbClr val="3C5790"/>
-                </a:solidFill>
-              </a:rPr>
-              <a:t>Jtest</a:t>
-            </a:r>
-            <a:r>
-              <a:rPr lang="en-US" sz="1400" dirty="0">
-                <a:solidFill>
-                  <a:srgbClr val="3C5790"/>
-                </a:solidFill>
-              </a:rPr>
-              <a:t>: has a large suite of purposes</a:t>
-            </a:r>
-          </a:p>
-          <a:p>
-            <a:endParaRPr lang="en-US" sz="1400" dirty="0">
-              <a:solidFill>
-                <a:srgbClr val="3C5790"/>
-              </a:solidFill>
-            </a:endParaRPr>
+              <a:t>stubs</a:t>
+            </a:r>
+            <a:r>
+              <a:rPr lang="en-US" sz="1400" dirty="0">
+                <a:solidFill>
+                  <a:srgbClr val="3C5790"/>
+                </a:solidFill>
+              </a:rPr>
+              <a:t> implements business logic.</a:t>
+            </a:r>
           </a:p>
         </p:txBody>
       </p:sp>
     </p:spTree>
     <p:extLst>
       <p:ext uri="{BB962C8B-B14F-4D97-AF65-F5344CB8AC3E}">
-        <p14:creationId xmlns:p14="http://schemas.microsoft.com/office/powerpoint/2010/main" val="2617873789"/>
+        <p14:creationId xmlns:p14="http://schemas.microsoft.com/office/powerpoint/2010/main" val="1673992762"/>
       </p:ext>
     </p:extLst>
   </p:cSld>
@@ -9642,7 +12161,7 @@
 </p:sld>
 </file>
 
-<file path=ppt/slides/slide31.xml><?xml version="1.0" encoding="utf-8"?>
+<file path=ppt/slides/slide44.xml><?xml version="1.0" encoding="utf-8"?>
 <p:sld xmlns:a="http://schemas.openxmlformats.org/drawingml/2006/main" xmlns:r="http://schemas.openxmlformats.org/officeDocument/2006/relationships" xmlns:p="http://schemas.openxmlformats.org/presentationml/2006/main">
   <p:cSld>
     <p:bg>
@@ -9698,7 +12217,7 @@
                   <a:schemeClr val="bg1"/>
                 </a:solidFill>
               </a:rPr>
-              <a:t>Mocks</a:t>
+              <a:t>Mocks (cont.)</a:t>
             </a:r>
             <a:endParaRPr lang="fr-CA" sz="3000" dirty="0">
               <a:solidFill>
@@ -9734,69 +12253,90 @@
                   <a:srgbClr val="3C5790"/>
                 </a:solidFill>
               </a:rPr>
-              <a:t>Testing in isolation offers strong benefits.</a:t>
-            </a:r>
-          </a:p>
-          <a:p>
-            <a:r>
-              <a:rPr lang="en-US" sz="1400" b="1" dirty="0">
-                <a:solidFill>
-                  <a:srgbClr val="3C5790"/>
-                </a:solidFill>
-              </a:rPr>
-              <a:t>Mock</a:t>
-            </a:r>
-            <a:r>
-              <a:rPr lang="en-US" sz="1400" dirty="0">
-                <a:solidFill>
-                  <a:srgbClr val="3C5790"/>
-                </a:solidFill>
-              </a:rPr>
-              <a:t> objects (or mocks) are perfect for testing a portion of code logic in isolation from the rest of the code.</a:t>
-            </a:r>
-          </a:p>
-          <a:p>
-            <a:r>
-              <a:rPr lang="en-US" sz="1400" dirty="0">
-                <a:solidFill>
-                  <a:srgbClr val="3C5790"/>
-                </a:solidFill>
-              </a:rPr>
-              <a:t>Mocks don't implement any logic, they're empty shells that provide methods to let the test control the behavior of the business. </a:t>
-            </a:r>
-          </a:p>
-          <a:p>
-            <a:r>
-              <a:rPr lang="en-US" sz="1400" dirty="0">
-                <a:solidFill>
-                  <a:srgbClr val="3C5790"/>
-                </a:solidFill>
-              </a:rPr>
-              <a:t>Only </a:t>
-            </a:r>
-            <a:r>
-              <a:rPr lang="en-US" sz="1400" b="1" dirty="0">
-                <a:solidFill>
-                  <a:srgbClr val="3C5790"/>
-                </a:solidFill>
-              </a:rPr>
-              <a:t>stubs</a:t>
-            </a:r>
-            <a:r>
-              <a:rPr lang="en-US" sz="1400" dirty="0">
-                <a:solidFill>
-                  <a:srgbClr val="3C5790"/>
-                </a:solidFill>
-              </a:rPr>
-              <a:t> implements business logic.</a:t>
-            </a:r>
+              <a:t>Mock frameworks:</a:t>
+            </a:r>
+          </a:p>
+          <a:p>
+            <a:pPr lvl="1"/>
+            <a:r>
+              <a:rPr lang="en-US" sz="1400" dirty="0" err="1">
+                <a:solidFill>
+                  <a:srgbClr val="3C5790"/>
+                </a:solidFill>
+              </a:rPr>
+              <a:t>EasyMock</a:t>
+            </a:r>
+            <a:endParaRPr lang="en-US" sz="1400" dirty="0">
+              <a:solidFill>
+                <a:srgbClr val="3C5790"/>
+              </a:solidFill>
+            </a:endParaRPr>
+          </a:p>
+          <a:p>
+            <a:pPr lvl="1"/>
+            <a:r>
+              <a:rPr lang="en-US" sz="1400" dirty="0" err="1">
+                <a:solidFill>
+                  <a:srgbClr val="3C5790"/>
+                </a:solidFill>
+              </a:rPr>
+              <a:t>Jmock</a:t>
+            </a:r>
+            <a:endParaRPr lang="en-US" sz="1400" dirty="0">
+              <a:solidFill>
+                <a:srgbClr val="3C5790"/>
+              </a:solidFill>
+            </a:endParaRPr>
+          </a:p>
+          <a:p>
+            <a:pPr lvl="1"/>
+            <a:r>
+              <a:rPr lang="en-US" sz="1400" dirty="0" err="1">
+                <a:solidFill>
+                  <a:srgbClr val="3C5790"/>
+                </a:solidFill>
+              </a:rPr>
+              <a:t>JMockit</a:t>
+            </a:r>
+            <a:endParaRPr lang="en-US" sz="1400" dirty="0">
+              <a:solidFill>
+                <a:srgbClr val="3C5790"/>
+              </a:solidFill>
+            </a:endParaRPr>
+          </a:p>
+          <a:p>
+            <a:pPr lvl="1"/>
+            <a:r>
+              <a:rPr lang="en-US" sz="1400" dirty="0">
+                <a:solidFill>
+                  <a:srgbClr val="3C5790"/>
+                </a:solidFill>
+              </a:rPr>
+              <a:t>Mockito</a:t>
+            </a:r>
+          </a:p>
+          <a:p>
+            <a:pPr lvl="1"/>
+            <a:r>
+              <a:rPr lang="en-US" sz="1400" dirty="0" err="1">
+                <a:solidFill>
+                  <a:srgbClr val="3C5790"/>
+                </a:solidFill>
+              </a:rPr>
+              <a:t>Powermock</a:t>
+            </a:r>
+            <a:endParaRPr lang="en-US" sz="1400" dirty="0">
+              <a:solidFill>
+                <a:srgbClr val="3C5790"/>
+              </a:solidFill>
+            </a:endParaRPr>
           </a:p>
         </p:txBody>
       </p:sp>
     </p:spTree>
     <p:extLst>
       <p:ext uri="{BB962C8B-B14F-4D97-AF65-F5344CB8AC3E}">
-        <p14:creationId xmlns:p14="http://schemas.microsoft.com/office/powerpoint/2010/main" val="1673992762"/>
+        <p14:creationId xmlns:p14="http://schemas.microsoft.com/office/powerpoint/2010/main" val="4125837102"/>
       </p:ext>
     </p:extLst>
   </p:cSld>
@@ -9806,7 +12346,7 @@
 </p:sld>
 </file>
 
-<file path=ppt/slides/slide32.xml><?xml version="1.0" encoding="utf-8"?>
+<file path=ppt/slides/slide45.xml><?xml version="1.0" encoding="utf-8"?>
 <p:sld xmlns:a="http://schemas.openxmlformats.org/drawingml/2006/main" xmlns:r="http://schemas.openxmlformats.org/officeDocument/2006/relationships" xmlns:p="http://schemas.openxmlformats.org/presentationml/2006/main">
   <p:cSld>
     <p:bg>
@@ -9862,7 +12402,7 @@
                   <a:schemeClr val="bg1"/>
                 </a:solidFill>
               </a:rPr>
-              <a:t>Mocks (cont.)</a:t>
+              <a:t>Conclusions</a:t>
             </a:r>
             <a:endParaRPr lang="fr-CA" sz="3000" dirty="0">
               <a:solidFill>
@@ -9885,7 +12425,7 @@
         <p:spPr>
           <a:xfrm>
             <a:off x="76200" y="1981200"/>
-            <a:ext cx="8686800" cy="3200400"/>
+            <a:ext cx="8686800" cy="4648200"/>
           </a:xfrm>
         </p:spPr>
         <p:txBody>
@@ -9898,90 +12438,42 @@
                   <a:srgbClr val="3C5790"/>
                 </a:solidFill>
               </a:rPr>
-              <a:t>Mock frameworks:</a:t>
-            </a:r>
-          </a:p>
-          <a:p>
-            <a:pPr lvl="1"/>
-            <a:r>
-              <a:rPr lang="en-US" sz="1400" dirty="0" err="1">
-                <a:solidFill>
-                  <a:srgbClr val="3C5790"/>
-                </a:solidFill>
-              </a:rPr>
-              <a:t>EasyMock</a:t>
-            </a:r>
+              <a:t>JUnit allows to write code faster, which increase quality</a:t>
+            </a:r>
+          </a:p>
+          <a:p>
+            <a:r>
+              <a:rPr lang="en-US" sz="1400" dirty="0">
+                <a:solidFill>
+                  <a:srgbClr val="3C5790"/>
+                </a:solidFill>
+              </a:rPr>
+              <a:t>JUnit tests can be run automatically and then check their own results and provide immediate feedback</a:t>
+            </a:r>
+          </a:p>
+          <a:p>
+            <a:r>
+              <a:rPr lang="en-US" sz="1400" dirty="0">
+                <a:solidFill>
+                  <a:srgbClr val="3C5790"/>
+                </a:solidFill>
+              </a:rPr>
+              <a:t>JUnit is documented</a:t>
+            </a:r>
+          </a:p>
+          <a:p>
             <a:endParaRPr lang="en-US" sz="1400" dirty="0">
               <a:solidFill>
                 <a:srgbClr val="3C5790"/>
               </a:solidFill>
             </a:endParaRPr>
           </a:p>
-          <a:p>
-            <a:pPr lvl="1"/>
-            <a:r>
-              <a:rPr lang="en-US" sz="1400" dirty="0" err="1">
-                <a:solidFill>
-                  <a:srgbClr val="3C5790"/>
-                </a:solidFill>
-              </a:rPr>
-              <a:t>Jmock</a:t>
-            </a:r>
-            <a:endParaRPr lang="en-US" sz="1400" dirty="0">
-              <a:solidFill>
-                <a:srgbClr val="3C5790"/>
-              </a:solidFill>
-            </a:endParaRPr>
-          </a:p>
-          <a:p>
-            <a:pPr lvl="1"/>
-            <a:r>
-              <a:rPr lang="en-US" sz="1400" dirty="0" err="1">
-                <a:solidFill>
-                  <a:srgbClr val="3C5790"/>
-                </a:solidFill>
-              </a:rPr>
-              <a:t>JMockit</a:t>
-            </a:r>
-            <a:endParaRPr lang="en-US" sz="1400" dirty="0">
-              <a:solidFill>
-                <a:srgbClr val="3C5790"/>
-              </a:solidFill>
-            </a:endParaRPr>
-          </a:p>
-          <a:p>
-            <a:pPr lvl="1"/>
-            <a:r>
-              <a:rPr lang="en-US" sz="1400" dirty="0">
-                <a:solidFill>
-                  <a:srgbClr val="3C5790"/>
-                </a:solidFill>
-              </a:rPr>
-              <a:t>Mockito</a:t>
-            </a:r>
-          </a:p>
-          <a:p>
-            <a:pPr lvl="1"/>
-            <a:r>
-              <a:rPr lang="en-US" sz="1400" dirty="0" err="1">
-                <a:solidFill>
-                  <a:srgbClr val="3C5790"/>
-                </a:solidFill>
-              </a:rPr>
-              <a:t>Powermock</a:t>
-            </a:r>
-            <a:endParaRPr lang="en-US" sz="1400" dirty="0">
-              <a:solidFill>
-                <a:srgbClr val="3C5790"/>
-              </a:solidFill>
-            </a:endParaRPr>
-          </a:p>
         </p:txBody>
       </p:sp>
     </p:spTree>
     <p:extLst>
       <p:ext uri="{BB962C8B-B14F-4D97-AF65-F5344CB8AC3E}">
-        <p14:creationId xmlns:p14="http://schemas.microsoft.com/office/powerpoint/2010/main" val="4125837102"/>
+        <p14:creationId xmlns:p14="http://schemas.microsoft.com/office/powerpoint/2010/main" val="4081448307"/>
       </p:ext>
     </p:extLst>
   </p:cSld>
@@ -9991,7 +12483,7 @@
 </p:sld>
 </file>
 
-<file path=ppt/slides/slide33.xml><?xml version="1.0" encoding="utf-8"?>
+<file path=ppt/slides/slide46.xml><?xml version="1.0" encoding="utf-8"?>
 <p:sld xmlns:a="http://schemas.openxmlformats.org/drawingml/2006/main" xmlns:r="http://schemas.openxmlformats.org/officeDocument/2006/relationships" xmlns:p="http://schemas.openxmlformats.org/presentationml/2006/main">
   <p:cSld>
     <p:bg>
@@ -10022,143 +12514,6 @@
       </p:grpSpPr>
       <p:sp>
         <p:nvSpPr>
-          <p:cNvPr id="4098" name="Titre 3"/>
-          <p:cNvSpPr>
-            <a:spLocks noGrp="1"/>
-          </p:cNvSpPr>
-          <p:nvPr>
-            <p:ph type="title"/>
-          </p:nvPr>
-        </p:nvSpPr>
-        <p:spPr>
-          <a:xfrm>
-            <a:off x="228600" y="274638"/>
-            <a:ext cx="8686800" cy="1143000"/>
-          </a:xfrm>
-        </p:spPr>
-        <p:txBody>
-          <a:bodyPr/>
-          <a:lstStyle/>
-          <a:p>
-            <a:pPr lvl="1"/>
-            <a:r>
-              <a:rPr lang="en-US" sz="3200" dirty="0">
-                <a:solidFill>
-                  <a:schemeClr val="bg1"/>
-                </a:solidFill>
-              </a:rPr>
-              <a:t>Conclusions</a:t>
-            </a:r>
-            <a:endParaRPr lang="fr-CA" sz="3000" dirty="0">
-              <a:solidFill>
-                <a:schemeClr val="bg1"/>
-              </a:solidFill>
-            </a:endParaRPr>
-          </a:p>
-        </p:txBody>
-      </p:sp>
-      <p:sp>
-        <p:nvSpPr>
-          <p:cNvPr id="4099" name="Espace réservé du contenu 4"/>
-          <p:cNvSpPr>
-            <a:spLocks noGrp="1"/>
-          </p:cNvSpPr>
-          <p:nvPr>
-            <p:ph idx="1"/>
-          </p:nvPr>
-        </p:nvSpPr>
-        <p:spPr>
-          <a:xfrm>
-            <a:off x="76200" y="1981200"/>
-            <a:ext cx="8686800" cy="4648200"/>
-          </a:xfrm>
-        </p:spPr>
-        <p:txBody>
-          <a:bodyPr/>
-          <a:lstStyle/>
-          <a:p>
-            <a:r>
-              <a:rPr lang="en-US" sz="1400" dirty="0">
-                <a:solidFill>
-                  <a:srgbClr val="3C5790"/>
-                </a:solidFill>
-              </a:rPr>
-              <a:t>JUnit allows to write code faster, which increase quality</a:t>
-            </a:r>
-          </a:p>
-          <a:p>
-            <a:r>
-              <a:rPr lang="en-US" sz="1400" dirty="0">
-                <a:solidFill>
-                  <a:srgbClr val="3C5790"/>
-                </a:solidFill>
-              </a:rPr>
-              <a:t>JUnit tests can be run automatically and then check their own results and provide immediate feedback</a:t>
-            </a:r>
-          </a:p>
-          <a:p>
-            <a:r>
-              <a:rPr lang="en-US" sz="1400" dirty="0">
-                <a:solidFill>
-                  <a:srgbClr val="3C5790"/>
-                </a:solidFill>
-              </a:rPr>
-              <a:t>JUnit is documented</a:t>
-            </a:r>
-          </a:p>
-          <a:p>
-            <a:endParaRPr lang="en-US" sz="1400" dirty="0">
-              <a:solidFill>
-                <a:srgbClr val="3C5790"/>
-              </a:solidFill>
-            </a:endParaRPr>
-          </a:p>
-        </p:txBody>
-      </p:sp>
-    </p:spTree>
-    <p:extLst>
-      <p:ext uri="{BB962C8B-B14F-4D97-AF65-F5344CB8AC3E}">
-        <p14:creationId xmlns:p14="http://schemas.microsoft.com/office/powerpoint/2010/main" val="4081448307"/>
-      </p:ext>
-    </p:extLst>
-  </p:cSld>
-  <p:clrMapOvr>
-    <a:masterClrMapping/>
-  </p:clrMapOvr>
-</p:sld>
-</file>
-
-<file path=ppt/slides/slide34.xml><?xml version="1.0" encoding="utf-8"?>
-<p:sld xmlns:a="http://schemas.openxmlformats.org/drawingml/2006/main" xmlns:r="http://schemas.openxmlformats.org/officeDocument/2006/relationships" xmlns:p="http://schemas.openxmlformats.org/presentationml/2006/main">
-  <p:cSld>
-    <p:bg>
-      <p:bgPr>
-        <a:blipFill dpi="0" rotWithShape="0">
-          <a:blip r:embed="rId2" cstate="print"/>
-          <a:srcRect/>
-          <a:stretch>
-            <a:fillRect/>
-          </a:stretch>
-        </a:blipFill>
-        <a:effectLst/>
-      </p:bgPr>
-    </p:bg>
-    <p:spTree>
-      <p:nvGrpSpPr>
-        <p:cNvPr id="1" name=""/>
-        <p:cNvGrpSpPr/>
-        <p:nvPr/>
-      </p:nvGrpSpPr>
-      <p:grpSpPr>
-        <a:xfrm>
-          <a:off x="0" y="0"/>
-          <a:ext cx="0" cy="0"/>
-          <a:chOff x="0" y="0"/>
-          <a:chExt cx="0" cy="0"/>
-        </a:xfrm>
-      </p:grpSpPr>
-      <p:sp>
-        <p:nvSpPr>
           <p:cNvPr id="5122" name="Titre 3"/>
           <p:cNvSpPr>
             <a:spLocks noGrp="1"/>
@@ -10233,6 +12588,25 @@
           </a:p>
           <a:p>
             <a:r>
+              <a:rPr lang="en-US" sz="1600" dirty="0">
+                <a:solidFill>
+                  <a:schemeClr val="bg1">
+                    <a:lumMod val="95000"/>
+                  </a:schemeClr>
+                </a:solidFill>
+              </a:rPr>
+              <a:t>https://www.baeldung.com/junit-4-rules</a:t>
+            </a:r>
+            <a:endParaRPr lang="fr-CA" sz="1600" dirty="0">
+              <a:solidFill>
+                <a:schemeClr val="bg1">
+                  <a:lumMod val="95000"/>
+                </a:schemeClr>
+              </a:solidFill>
+            </a:endParaRPr>
+          </a:p>
+          <a:p>
+            <a:r>
               <a:rPr lang="fr-CA" sz="1600" dirty="0">
                 <a:solidFill>
                   <a:schemeClr val="bg1"/>
@@ -10245,224 +12619,6 @@
             <a:endParaRPr lang="fr-CA" sz="1600" dirty="0">
               <a:solidFill>
                 <a:schemeClr val="bg1"/>
-              </a:solidFill>
-            </a:endParaRPr>
-          </a:p>
-        </p:txBody>
-      </p:sp>
-    </p:spTree>
-  </p:cSld>
-  <p:clrMapOvr>
-    <a:masterClrMapping/>
-  </p:clrMapOvr>
-</p:sld>
-</file>
-
-<file path=ppt/slides/slide4.xml><?xml version="1.0" encoding="utf-8"?>
-<p:sld xmlns:a="http://schemas.openxmlformats.org/drawingml/2006/main" xmlns:r="http://schemas.openxmlformats.org/officeDocument/2006/relationships" xmlns:p="http://schemas.openxmlformats.org/presentationml/2006/main">
-  <p:cSld>
-    <p:bg>
-      <p:bgPr>
-        <a:blipFill dpi="0" rotWithShape="0">
-          <a:blip r:embed="rId2" cstate="print"/>
-          <a:srcRect/>
-          <a:stretch>
-            <a:fillRect/>
-          </a:stretch>
-        </a:blipFill>
-        <a:effectLst/>
-      </p:bgPr>
-    </p:bg>
-    <p:spTree>
-      <p:nvGrpSpPr>
-        <p:cNvPr id="1" name=""/>
-        <p:cNvGrpSpPr/>
-        <p:nvPr/>
-      </p:nvGrpSpPr>
-      <p:grpSpPr>
-        <a:xfrm>
-          <a:off x="0" y="0"/>
-          <a:ext cx="0" cy="0"/>
-          <a:chOff x="0" y="0"/>
-          <a:chExt cx="0" cy="0"/>
-        </a:xfrm>
-      </p:grpSpPr>
-      <p:sp>
-        <p:nvSpPr>
-          <p:cNvPr id="4098" name="Titre 3"/>
-          <p:cNvSpPr>
-            <a:spLocks noGrp="1"/>
-          </p:cNvSpPr>
-          <p:nvPr>
-            <p:ph type="title"/>
-          </p:nvPr>
-        </p:nvSpPr>
-        <p:spPr/>
-        <p:txBody>
-          <a:bodyPr/>
-          <a:lstStyle/>
-          <a:p>
-            <a:r>
-              <a:rPr lang="fr-CA" dirty="0" err="1">
-                <a:solidFill>
-                  <a:schemeClr val="bg1"/>
-                </a:solidFill>
-              </a:rPr>
-              <a:t>Features</a:t>
-            </a:r>
-            <a:endParaRPr lang="fr-CA" dirty="0">
-              <a:solidFill>
-                <a:schemeClr val="bg1"/>
-              </a:solidFill>
-            </a:endParaRPr>
-          </a:p>
-        </p:txBody>
-      </p:sp>
-      <p:sp>
-        <p:nvSpPr>
-          <p:cNvPr id="4099" name="Espace réservé du contenu 4"/>
-          <p:cNvSpPr>
-            <a:spLocks noGrp="1"/>
-          </p:cNvSpPr>
-          <p:nvPr>
-            <p:ph idx="1"/>
-          </p:nvPr>
-        </p:nvSpPr>
-        <p:spPr>
-          <a:xfrm>
-            <a:off x="304800" y="1905000"/>
-            <a:ext cx="8534400" cy="3962400"/>
-          </a:xfrm>
-        </p:spPr>
-        <p:txBody>
-          <a:bodyPr/>
-          <a:lstStyle/>
-          <a:p>
-            <a:r>
-              <a:rPr lang="en-US" sz="1400" dirty="0">
-                <a:solidFill>
-                  <a:srgbClr val="3C5790"/>
-                </a:solidFill>
-              </a:rPr>
-              <a:t>Separate test class instances and class loaders for each unit test to avoid side effects.</a:t>
-            </a:r>
-          </a:p>
-          <a:p>
-            <a:r>
-              <a:rPr lang="en-US" sz="1400" dirty="0">
-                <a:solidFill>
-                  <a:srgbClr val="3C5790"/>
-                </a:solidFill>
-              </a:rPr>
-              <a:t>JUnit annotations to provide resource initialization and call methods: @Before, @</a:t>
-            </a:r>
-            <a:r>
-              <a:rPr lang="en-US" sz="1400" dirty="0" err="1">
-                <a:solidFill>
-                  <a:srgbClr val="3C5790"/>
-                </a:solidFill>
-              </a:rPr>
-              <a:t>BeforeClass</a:t>
-            </a:r>
-            <a:r>
-              <a:rPr lang="en-US" sz="1400" dirty="0">
-                <a:solidFill>
-                  <a:srgbClr val="3C5790"/>
-                </a:solidFill>
-              </a:rPr>
-              <a:t>, @After, @</a:t>
-            </a:r>
-            <a:r>
-              <a:rPr lang="en-US" sz="1400" dirty="0" err="1">
-                <a:solidFill>
-                  <a:srgbClr val="3C5790"/>
-                </a:solidFill>
-              </a:rPr>
-              <a:t>AfterClass</a:t>
-            </a:r>
-            <a:r>
-              <a:rPr lang="en-US" sz="1400" dirty="0">
-                <a:solidFill>
-                  <a:srgbClr val="3C5790"/>
-                </a:solidFill>
-              </a:rPr>
-              <a:t>.</a:t>
-            </a:r>
-          </a:p>
-          <a:p>
-            <a:r>
-              <a:rPr lang="en-US" sz="1400" dirty="0">
-                <a:solidFill>
-                  <a:srgbClr val="3C5790"/>
-                </a:solidFill>
-              </a:rPr>
-              <a:t>A variety of assert methods to make it easy to check the results of the tests.</a:t>
-            </a:r>
-          </a:p>
-          <a:p>
-            <a:r>
-              <a:rPr lang="en-US" sz="1400" dirty="0">
-                <a:solidFill>
-                  <a:srgbClr val="3C5790"/>
-                </a:solidFill>
-              </a:rPr>
-              <a:t>Provides test runners for running tests.</a:t>
-            </a:r>
-          </a:p>
-          <a:p>
-            <a:r>
-              <a:rPr lang="en-US" sz="1400" dirty="0">
-                <a:solidFill>
-                  <a:srgbClr val="3C5790"/>
-                </a:solidFill>
-              </a:rPr>
-              <a:t>Integration with tools like And, Maven.</a:t>
-            </a:r>
-          </a:p>
-          <a:p>
-            <a:r>
-              <a:rPr lang="en-US" sz="1400" dirty="0">
-                <a:solidFill>
-                  <a:srgbClr val="3C5790"/>
-                </a:solidFill>
-              </a:rPr>
-              <a:t>Integration with IDEs like Eclipse, NetBeans, </a:t>
-            </a:r>
-            <a:r>
-              <a:rPr lang="en-US" sz="1400" dirty="0" err="1">
-                <a:solidFill>
-                  <a:srgbClr val="3C5790"/>
-                </a:solidFill>
-              </a:rPr>
-              <a:t>ItelliJ</a:t>
-            </a:r>
-            <a:r>
-              <a:rPr lang="en-US" sz="1400" dirty="0">
-                <a:solidFill>
-                  <a:srgbClr val="3C5790"/>
-                </a:solidFill>
-              </a:rPr>
-              <a:t>, </a:t>
-            </a:r>
-            <a:r>
-              <a:rPr lang="en-US" sz="1400" dirty="0" err="1">
-                <a:solidFill>
-                  <a:srgbClr val="3C5790"/>
-                </a:solidFill>
-              </a:rPr>
-              <a:t>Jbuilder</a:t>
-            </a:r>
-            <a:r>
-              <a:rPr lang="en-US" sz="1400" dirty="0">
-                <a:solidFill>
-                  <a:srgbClr val="3C5790"/>
-                </a:solidFill>
-              </a:rPr>
-              <a:t>.</a:t>
-            </a:r>
-            <a:endParaRPr lang="en-US" sz="1200" dirty="0">
-              <a:solidFill>
-                <a:srgbClr val="3C5790"/>
               </a:solidFill>
             </a:endParaRPr>
           </a:p>

</xml_diff>

<commit_message>
added Docker for Java developers
</commit_message>
<xml_diff>
--- a/Presentations/Junit4/Junit4.pptx
+++ b/Presentations/Junit4/Junit4.pptx
@@ -389,7 +389,7 @@
               <a:pPr>
                 <a:defRPr/>
               </a:pPr>
-              <a:t>16/04/2020</a:t>
+              <a:t>21/04/2020</a:t>
             </a:fld>
             <a:endParaRPr lang="fr-CA"/>
           </a:p>
@@ -581,7 +581,7 @@
               <a:pPr>
                 <a:defRPr/>
               </a:pPr>
-              <a:t>16/04/2020</a:t>
+              <a:t>21/04/2020</a:t>
             </a:fld>
             <a:endParaRPr lang="fr-CA"/>
           </a:p>
@@ -783,7 +783,7 @@
               <a:pPr>
                 <a:defRPr/>
               </a:pPr>
-              <a:t>16/04/2020</a:t>
+              <a:t>21/04/2020</a:t>
             </a:fld>
             <a:endParaRPr lang="fr-CA"/>
           </a:p>
@@ -975,7 +975,7 @@
               <a:pPr>
                 <a:defRPr/>
               </a:pPr>
-              <a:t>16/04/2020</a:t>
+              <a:t>21/04/2020</a:t>
             </a:fld>
             <a:endParaRPr lang="fr-CA"/>
           </a:p>
@@ -1243,7 +1243,7 @@
               <a:pPr>
                 <a:defRPr/>
               </a:pPr>
-              <a:t>16/04/2020</a:t>
+              <a:t>21/04/2020</a:t>
             </a:fld>
             <a:endParaRPr lang="fr-CA"/>
           </a:p>
@@ -1553,7 +1553,7 @@
               <a:pPr>
                 <a:defRPr/>
               </a:pPr>
-              <a:t>16/04/2020</a:t>
+              <a:t>21/04/2020</a:t>
             </a:fld>
             <a:endParaRPr lang="fr-CA"/>
           </a:p>
@@ -1997,7 +1997,7 @@
               <a:pPr>
                 <a:defRPr/>
               </a:pPr>
-              <a:t>16/04/2020</a:t>
+              <a:t>21/04/2020</a:t>
             </a:fld>
             <a:endParaRPr lang="fr-CA"/>
           </a:p>
@@ -2137,7 +2137,7 @@
               <a:pPr>
                 <a:defRPr/>
               </a:pPr>
-              <a:t>16/04/2020</a:t>
+              <a:t>21/04/2020</a:t>
             </a:fld>
             <a:endParaRPr lang="fr-CA"/>
           </a:p>
@@ -2254,7 +2254,7 @@
               <a:pPr>
                 <a:defRPr/>
               </a:pPr>
-              <a:t>16/04/2020</a:t>
+              <a:t>21/04/2020</a:t>
             </a:fld>
             <a:endParaRPr lang="fr-CA"/>
           </a:p>
@@ -2553,7 +2553,7 @@
               <a:pPr>
                 <a:defRPr/>
               </a:pPr>
-              <a:t>16/04/2020</a:t>
+              <a:t>21/04/2020</a:t>
             </a:fld>
             <a:endParaRPr lang="fr-CA"/>
           </a:p>
@@ -2835,7 +2835,7 @@
               <a:pPr>
                 <a:defRPr/>
               </a:pPr>
-              <a:t>16/04/2020</a:t>
+              <a:t>21/04/2020</a:t>
             </a:fld>
             <a:endParaRPr lang="fr-CA"/>
           </a:p>
@@ -3099,7 +3099,7 @@
               <a:pPr>
                 <a:defRPr/>
               </a:pPr>
-              <a:t>16/04/2020</a:t>
+              <a:t>21/04/2020</a:t>
             </a:fld>
             <a:endParaRPr lang="fr-CA"/>
           </a:p>
@@ -11226,7 +11226,7 @@
                   <a:srgbClr val="3C5790"/>
                 </a:solidFill>
               </a:rPr>
-              <a:t>Integration with tools like And, Maven.</a:t>
+              <a:t>Integration with tools like Ant, Maven.</a:t>
             </a:r>
           </a:p>
           <a:p>

</xml_diff>